<commit_message>
add lab5, making public
</commit_message>
<xml_diff>
--- a/HW1/HW1.pptx
+++ b/HW1/HW1.pptx
@@ -4,6 +4,9 @@
   <p:sldMasterIdLst>
     <p:sldMasterId id="2147483660" r:id="rId1"/>
   </p:sldMasterIdLst>
+  <p:notesMasterIdLst>
+    <p:notesMasterId r:id="rId9"/>
+  </p:notesMasterIdLst>
   <p:sldIdLst>
     <p:sldId id="256" r:id="rId2"/>
     <p:sldId id="257" r:id="rId3"/>
@@ -946,11 +949,7 @@
           </a:r>
           <a:r>
             <a:rPr lang="en-US" baseline="0" dirty="0" smtClean="0"/>
-            <a:t> via WLAN with WPA2 </a:t>
-          </a:r>
-          <a:r>
-            <a:rPr lang="en-US" baseline="0" dirty="0" smtClean="0"/>
-            <a:t>security</a:t>
+            <a:t> via WLAN with WPA2 security</a:t>
           </a:r>
           <a:endParaRPr lang="en-US" dirty="0"/>
         </a:p>
@@ -1440,10 +1439,24 @@
     <dgm:pt modelId="{B29EB7F7-8087-4D8B-9ACA-849B1952AA03}" type="parTrans" cxnId="{4DA092A3-855E-415B-B153-FDD63A5B7CD0}">
       <dgm:prSet/>
       <dgm:spPr/>
+      <dgm:t>
+        <a:bodyPr/>
+        <a:lstStyle/>
+        <a:p>
+          <a:endParaRPr lang="en-US"/>
+        </a:p>
+      </dgm:t>
     </dgm:pt>
     <dgm:pt modelId="{7D36A1C4-7D5D-4C07-9A94-8C8FE4CE61CA}" type="sibTrans" cxnId="{4DA092A3-855E-415B-B153-FDD63A5B7CD0}">
       <dgm:prSet/>
       <dgm:spPr/>
+      <dgm:t>
+        <a:bodyPr/>
+        <a:lstStyle/>
+        <a:p>
+          <a:endParaRPr lang="en-US"/>
+        </a:p>
+      </dgm:t>
     </dgm:pt>
     <dgm:pt modelId="{A456EA5D-8518-B54B-AB06-0538D71E6ECE}" type="pres">
       <dgm:prSet presAssocID="{6398A917-0180-D447-B8D9-09D301527380}" presName="linearFlow" presStyleCnt="0">
@@ -1708,7 +1721,7 @@
   <dgm:whole/>
   <dgm:extLst>
     <a:ext uri="http://schemas.microsoft.com/office/drawing/2008/diagram">
-      <dsp:dataModelExt xmlns:dsp="http://schemas.microsoft.com/office/drawing/2008/diagram" relId="rId6" minVer="http://schemas.openxmlformats.org/drawingml/2006/diagram"/>
+      <dsp:dataModelExt xmlns:dsp="http://schemas.microsoft.com/office/drawing/2008/diagram" relId="rId7" minVer="http://schemas.openxmlformats.org/drawingml/2006/diagram"/>
     </a:ext>
   </dgm:extLst>
 </dgm:dataModel>
@@ -1898,11 +1911,7 @@
           </a:r>
           <a:r>
             <a:rPr lang="en-US" sz="1500" kern="1200" baseline="0" dirty="0" smtClean="0"/>
-            <a:t> via WLAN with WPA2 </a:t>
-          </a:r>
-          <a:r>
-            <a:rPr lang="en-US" sz="1500" kern="1200" baseline="0" dirty="0" smtClean="0"/>
-            <a:t>security</a:t>
+            <a:t> via WLAN with WPA2 security</a:t>
           </a:r>
           <a:endParaRPr lang="en-US" sz="1500" kern="1200" dirty="0"/>
         </a:p>
@@ -4015,6 +4024,884 @@
 </dgm:styleDef>
 </file>
 
+<file path=ppt/notesMasters/notesMaster1.xml><?xml version="1.0" encoding="utf-8"?>
+<p:notesMaster xmlns:a="http://schemas.openxmlformats.org/drawingml/2006/main" xmlns:r="http://schemas.openxmlformats.org/officeDocument/2006/relationships" xmlns:p="http://schemas.openxmlformats.org/presentationml/2006/main">
+  <p:cSld>
+    <p:bg>
+      <p:bgRef idx="1001">
+        <a:schemeClr val="bg1"/>
+      </p:bgRef>
+    </p:bg>
+    <p:spTree>
+      <p:nvGrpSpPr>
+        <p:cNvPr id="1" name=""/>
+        <p:cNvGrpSpPr/>
+        <p:nvPr/>
+      </p:nvGrpSpPr>
+      <p:grpSpPr>
+        <a:xfrm>
+          <a:off x="0" y="0"/>
+          <a:ext cx="0" cy="0"/>
+          <a:chOff x="0" y="0"/>
+          <a:chExt cx="0" cy="0"/>
+        </a:xfrm>
+      </p:grpSpPr>
+      <p:sp>
+        <p:nvSpPr>
+          <p:cNvPr id="2" name="Header Placeholder 1"/>
+          <p:cNvSpPr>
+            <a:spLocks noGrp="1"/>
+          </p:cNvSpPr>
+          <p:nvPr>
+            <p:ph type="hdr" sz="quarter"/>
+          </p:nvPr>
+        </p:nvSpPr>
+        <p:spPr>
+          <a:xfrm>
+            <a:off x="0" y="0"/>
+            <a:ext cx="2971800" cy="458788"/>
+          </a:xfrm>
+          <a:prstGeom prst="rect">
+            <a:avLst/>
+          </a:prstGeom>
+        </p:spPr>
+        <p:txBody>
+          <a:bodyPr vert="horz" lIns="91440" tIns="45720" rIns="91440" bIns="45720" rtlCol="0"/>
+          <a:lstStyle>
+            <a:lvl1pPr algn="l">
+              <a:defRPr sz="1200"/>
+            </a:lvl1pPr>
+          </a:lstStyle>
+          <a:p>
+            <a:endParaRPr lang="en-US"/>
+          </a:p>
+        </p:txBody>
+      </p:sp>
+      <p:sp>
+        <p:nvSpPr>
+          <p:cNvPr id="3" name="Date Placeholder 2"/>
+          <p:cNvSpPr>
+            <a:spLocks noGrp="1"/>
+          </p:cNvSpPr>
+          <p:nvPr>
+            <p:ph type="dt" idx="1"/>
+          </p:nvPr>
+        </p:nvSpPr>
+        <p:spPr>
+          <a:xfrm>
+            <a:off x="3884613" y="0"/>
+            <a:ext cx="2971800" cy="458788"/>
+          </a:xfrm>
+          <a:prstGeom prst="rect">
+            <a:avLst/>
+          </a:prstGeom>
+        </p:spPr>
+        <p:txBody>
+          <a:bodyPr vert="horz" lIns="91440" tIns="45720" rIns="91440" bIns="45720" rtlCol="0"/>
+          <a:lstStyle>
+            <a:lvl1pPr algn="r">
+              <a:defRPr sz="1200"/>
+            </a:lvl1pPr>
+          </a:lstStyle>
+          <a:p>
+            <a:fld id="{BB20FC15-684C-F342-8187-51103406D962}" type="datetimeFigureOut">
+              <a:rPr lang="en-US" smtClean="0"/>
+              <a:t>9/28/16</a:t>
+            </a:fld>
+            <a:endParaRPr lang="en-US"/>
+          </a:p>
+        </p:txBody>
+      </p:sp>
+      <p:sp>
+        <p:nvSpPr>
+          <p:cNvPr id="4" name="Slide Image Placeholder 3"/>
+          <p:cNvSpPr>
+            <a:spLocks noGrp="1" noRot="1" noChangeAspect="1"/>
+          </p:cNvSpPr>
+          <p:nvPr>
+            <p:ph type="sldImg" idx="2"/>
+          </p:nvPr>
+        </p:nvSpPr>
+        <p:spPr>
+          <a:xfrm>
+            <a:off x="685800" y="1143000"/>
+            <a:ext cx="5486400" cy="3086100"/>
+          </a:xfrm>
+          <a:prstGeom prst="rect">
+            <a:avLst/>
+          </a:prstGeom>
+          <a:noFill/>
+          <a:ln w="12700">
+            <a:solidFill>
+              <a:prstClr val="black"/>
+            </a:solidFill>
+          </a:ln>
+        </p:spPr>
+        <p:txBody>
+          <a:bodyPr vert="horz" lIns="91440" tIns="45720" rIns="91440" bIns="45720" rtlCol="0" anchor="ctr"/>
+          <a:lstStyle/>
+          <a:p>
+            <a:endParaRPr lang="en-US"/>
+          </a:p>
+        </p:txBody>
+      </p:sp>
+      <p:sp>
+        <p:nvSpPr>
+          <p:cNvPr id="5" name="Notes Placeholder 4"/>
+          <p:cNvSpPr>
+            <a:spLocks noGrp="1"/>
+          </p:cNvSpPr>
+          <p:nvPr>
+            <p:ph type="body" sz="quarter" idx="3"/>
+          </p:nvPr>
+        </p:nvSpPr>
+        <p:spPr>
+          <a:xfrm>
+            <a:off x="685800" y="4400550"/>
+            <a:ext cx="5486400" cy="3600450"/>
+          </a:xfrm>
+          <a:prstGeom prst="rect">
+            <a:avLst/>
+          </a:prstGeom>
+        </p:spPr>
+        <p:txBody>
+          <a:bodyPr vert="horz" lIns="91440" tIns="45720" rIns="91440" bIns="45720" rtlCol="0"/>
+          <a:lstStyle/>
+          <a:p>
+            <a:pPr lvl="0"/>
+            <a:r>
+              <a:rPr lang="en-US" smtClean="0"/>
+              <a:t>Click to edit Master text styles</a:t>
+            </a:r>
+          </a:p>
+          <a:p>
+            <a:pPr lvl="1"/>
+            <a:r>
+              <a:rPr lang="en-US" smtClean="0"/>
+              <a:t>Second level</a:t>
+            </a:r>
+          </a:p>
+          <a:p>
+            <a:pPr lvl="2"/>
+            <a:r>
+              <a:rPr lang="en-US" smtClean="0"/>
+              <a:t>Third level</a:t>
+            </a:r>
+          </a:p>
+          <a:p>
+            <a:pPr lvl="3"/>
+            <a:r>
+              <a:rPr lang="en-US" smtClean="0"/>
+              <a:t>Fourth level</a:t>
+            </a:r>
+          </a:p>
+          <a:p>
+            <a:pPr lvl="4"/>
+            <a:r>
+              <a:rPr lang="en-US" smtClean="0"/>
+              <a:t>Fifth level</a:t>
+            </a:r>
+            <a:endParaRPr lang="en-US"/>
+          </a:p>
+        </p:txBody>
+      </p:sp>
+      <p:sp>
+        <p:nvSpPr>
+          <p:cNvPr id="6" name="Footer Placeholder 5"/>
+          <p:cNvSpPr>
+            <a:spLocks noGrp="1"/>
+          </p:cNvSpPr>
+          <p:nvPr>
+            <p:ph type="ftr" sz="quarter" idx="4"/>
+          </p:nvPr>
+        </p:nvSpPr>
+        <p:spPr>
+          <a:xfrm>
+            <a:off x="0" y="8685213"/>
+            <a:ext cx="2971800" cy="458787"/>
+          </a:xfrm>
+          <a:prstGeom prst="rect">
+            <a:avLst/>
+          </a:prstGeom>
+        </p:spPr>
+        <p:txBody>
+          <a:bodyPr vert="horz" lIns="91440" tIns="45720" rIns="91440" bIns="45720" rtlCol="0" anchor="b"/>
+          <a:lstStyle>
+            <a:lvl1pPr algn="l">
+              <a:defRPr sz="1200"/>
+            </a:lvl1pPr>
+          </a:lstStyle>
+          <a:p>
+            <a:endParaRPr lang="en-US"/>
+          </a:p>
+        </p:txBody>
+      </p:sp>
+      <p:sp>
+        <p:nvSpPr>
+          <p:cNvPr id="7" name="Slide Number Placeholder 6"/>
+          <p:cNvSpPr>
+            <a:spLocks noGrp="1"/>
+          </p:cNvSpPr>
+          <p:nvPr>
+            <p:ph type="sldNum" sz="quarter" idx="5"/>
+          </p:nvPr>
+        </p:nvSpPr>
+        <p:spPr>
+          <a:xfrm>
+            <a:off x="3884613" y="8685213"/>
+            <a:ext cx="2971800" cy="458787"/>
+          </a:xfrm>
+          <a:prstGeom prst="rect">
+            <a:avLst/>
+          </a:prstGeom>
+        </p:spPr>
+        <p:txBody>
+          <a:bodyPr vert="horz" lIns="91440" tIns="45720" rIns="91440" bIns="45720" rtlCol="0" anchor="b"/>
+          <a:lstStyle>
+            <a:lvl1pPr algn="r">
+              <a:defRPr sz="1200"/>
+            </a:lvl1pPr>
+          </a:lstStyle>
+          <a:p>
+            <a:fld id="{1B8AF91D-EE9F-0F44-B09B-2FDEF4BE7828}" type="slidenum">
+              <a:rPr lang="en-US" smtClean="0"/>
+              <a:t>‹#›</a:t>
+            </a:fld>
+            <a:endParaRPr lang="en-US"/>
+          </a:p>
+        </p:txBody>
+      </p:sp>
+    </p:spTree>
+    <p:extLst>
+      <p:ext uri="{BB962C8B-B14F-4D97-AF65-F5344CB8AC3E}">
+        <p14:creationId xmlns:p14="http://schemas.microsoft.com/office/powerpoint/2010/main" val="616072101"/>
+      </p:ext>
+    </p:extLst>
+  </p:cSld>
+  <p:clrMap bg1="lt1" tx1="dk1" bg2="lt2" tx2="dk2" accent1="accent1" accent2="accent2" accent3="accent3" accent4="accent4" accent5="accent5" accent6="accent6" hlink="hlink" folHlink="folHlink"/>
+  <p:notesStyle>
+    <a:lvl1pPr marL="0" algn="l" defTabSz="914400" rtl="0" eaLnBrk="1" latinLnBrk="0" hangingPunct="1">
+      <a:defRPr sz="1200" kern="1200">
+        <a:solidFill>
+          <a:schemeClr val="tx1"/>
+        </a:solidFill>
+        <a:latin typeface="+mn-lt"/>
+        <a:ea typeface="+mn-ea"/>
+        <a:cs typeface="+mn-cs"/>
+      </a:defRPr>
+    </a:lvl1pPr>
+    <a:lvl2pPr marL="457200" algn="l" defTabSz="914400" rtl="0" eaLnBrk="1" latinLnBrk="0" hangingPunct="1">
+      <a:defRPr sz="1200" kern="1200">
+        <a:solidFill>
+          <a:schemeClr val="tx1"/>
+        </a:solidFill>
+        <a:latin typeface="+mn-lt"/>
+        <a:ea typeface="+mn-ea"/>
+        <a:cs typeface="+mn-cs"/>
+      </a:defRPr>
+    </a:lvl2pPr>
+    <a:lvl3pPr marL="914400" algn="l" defTabSz="914400" rtl="0" eaLnBrk="1" latinLnBrk="0" hangingPunct="1">
+      <a:defRPr sz="1200" kern="1200">
+        <a:solidFill>
+          <a:schemeClr val="tx1"/>
+        </a:solidFill>
+        <a:latin typeface="+mn-lt"/>
+        <a:ea typeface="+mn-ea"/>
+        <a:cs typeface="+mn-cs"/>
+      </a:defRPr>
+    </a:lvl3pPr>
+    <a:lvl4pPr marL="1371600" algn="l" defTabSz="914400" rtl="0" eaLnBrk="1" latinLnBrk="0" hangingPunct="1">
+      <a:defRPr sz="1200" kern="1200">
+        <a:solidFill>
+          <a:schemeClr val="tx1"/>
+        </a:solidFill>
+        <a:latin typeface="+mn-lt"/>
+        <a:ea typeface="+mn-ea"/>
+        <a:cs typeface="+mn-cs"/>
+      </a:defRPr>
+    </a:lvl4pPr>
+    <a:lvl5pPr marL="1828800" algn="l" defTabSz="914400" rtl="0" eaLnBrk="1" latinLnBrk="0" hangingPunct="1">
+      <a:defRPr sz="1200" kern="1200">
+        <a:solidFill>
+          <a:schemeClr val="tx1"/>
+        </a:solidFill>
+        <a:latin typeface="+mn-lt"/>
+        <a:ea typeface="+mn-ea"/>
+        <a:cs typeface="+mn-cs"/>
+      </a:defRPr>
+    </a:lvl5pPr>
+    <a:lvl6pPr marL="2286000" algn="l" defTabSz="914400" rtl="0" eaLnBrk="1" latinLnBrk="0" hangingPunct="1">
+      <a:defRPr sz="1200" kern="1200">
+        <a:solidFill>
+          <a:schemeClr val="tx1"/>
+        </a:solidFill>
+        <a:latin typeface="+mn-lt"/>
+        <a:ea typeface="+mn-ea"/>
+        <a:cs typeface="+mn-cs"/>
+      </a:defRPr>
+    </a:lvl6pPr>
+    <a:lvl7pPr marL="2743200" algn="l" defTabSz="914400" rtl="0" eaLnBrk="1" latinLnBrk="0" hangingPunct="1">
+      <a:defRPr sz="1200" kern="1200">
+        <a:solidFill>
+          <a:schemeClr val="tx1"/>
+        </a:solidFill>
+        <a:latin typeface="+mn-lt"/>
+        <a:ea typeface="+mn-ea"/>
+        <a:cs typeface="+mn-cs"/>
+      </a:defRPr>
+    </a:lvl7pPr>
+    <a:lvl8pPr marL="3200400" algn="l" defTabSz="914400" rtl="0" eaLnBrk="1" latinLnBrk="0" hangingPunct="1">
+      <a:defRPr sz="1200" kern="1200">
+        <a:solidFill>
+          <a:schemeClr val="tx1"/>
+        </a:solidFill>
+        <a:latin typeface="+mn-lt"/>
+        <a:ea typeface="+mn-ea"/>
+        <a:cs typeface="+mn-cs"/>
+      </a:defRPr>
+    </a:lvl8pPr>
+    <a:lvl9pPr marL="3657600" algn="l" defTabSz="914400" rtl="0" eaLnBrk="1" latinLnBrk="0" hangingPunct="1">
+      <a:defRPr sz="1200" kern="1200">
+        <a:solidFill>
+          <a:schemeClr val="tx1"/>
+        </a:solidFill>
+        <a:latin typeface="+mn-lt"/>
+        <a:ea typeface="+mn-ea"/>
+        <a:cs typeface="+mn-cs"/>
+      </a:defRPr>
+    </a:lvl9pPr>
+  </p:notesStyle>
+</p:notesMaster>
+</file>
+
+<file path=ppt/notesSlides/notesSlide1.xml><?xml version="1.0" encoding="utf-8"?>
+<p:notes xmlns:a="http://schemas.openxmlformats.org/drawingml/2006/main" xmlns:r="http://schemas.openxmlformats.org/officeDocument/2006/relationships" xmlns:p="http://schemas.openxmlformats.org/presentationml/2006/main">
+  <p:cSld>
+    <p:spTree>
+      <p:nvGrpSpPr>
+        <p:cNvPr id="1" name=""/>
+        <p:cNvGrpSpPr/>
+        <p:nvPr/>
+      </p:nvGrpSpPr>
+      <p:grpSpPr>
+        <a:xfrm>
+          <a:off x="0" y="0"/>
+          <a:ext cx="0" cy="0"/>
+          <a:chOff x="0" y="0"/>
+          <a:chExt cx="0" cy="0"/>
+        </a:xfrm>
+      </p:grpSpPr>
+      <p:sp>
+        <p:nvSpPr>
+          <p:cNvPr id="2" name="Slide Image Placeholder 1"/>
+          <p:cNvSpPr>
+            <a:spLocks noGrp="1" noRot="1" noChangeAspect="1"/>
+          </p:cNvSpPr>
+          <p:nvPr>
+            <p:ph type="sldImg"/>
+          </p:nvPr>
+        </p:nvSpPr>
+        <p:spPr/>
+      </p:sp>
+      <p:sp>
+        <p:nvSpPr>
+          <p:cNvPr id="3" name="Notes Placeholder 2"/>
+          <p:cNvSpPr>
+            <a:spLocks noGrp="1"/>
+          </p:cNvSpPr>
+          <p:nvPr>
+            <p:ph type="body" idx="1"/>
+          </p:nvPr>
+        </p:nvSpPr>
+        <p:spPr/>
+        <p:txBody>
+          <a:bodyPr/>
+          <a:lstStyle/>
+          <a:p>
+            <a:r>
+              <a:rPr lang="en-US" dirty="0" smtClean="0"/>
+              <a:t>Thomas</a:t>
+            </a:r>
+            <a:endParaRPr lang="en-US" dirty="0"/>
+          </a:p>
+        </p:txBody>
+      </p:sp>
+      <p:sp>
+        <p:nvSpPr>
+          <p:cNvPr id="4" name="Slide Number Placeholder 3"/>
+          <p:cNvSpPr>
+            <a:spLocks noGrp="1"/>
+          </p:cNvSpPr>
+          <p:nvPr>
+            <p:ph type="sldNum" sz="quarter" idx="10"/>
+          </p:nvPr>
+        </p:nvSpPr>
+        <p:spPr/>
+        <p:txBody>
+          <a:bodyPr/>
+          <a:lstStyle/>
+          <a:p>
+            <a:fld id="{1B8AF91D-EE9F-0F44-B09B-2FDEF4BE7828}" type="slidenum">
+              <a:rPr lang="en-US" smtClean="0"/>
+              <a:t>2</a:t>
+            </a:fld>
+            <a:endParaRPr lang="en-US"/>
+          </a:p>
+        </p:txBody>
+      </p:sp>
+    </p:spTree>
+    <p:extLst>
+      <p:ext uri="{BB962C8B-B14F-4D97-AF65-F5344CB8AC3E}">
+        <p14:creationId xmlns:p14="http://schemas.microsoft.com/office/powerpoint/2010/main" val="1078580782"/>
+      </p:ext>
+    </p:extLst>
+  </p:cSld>
+  <p:clrMapOvr>
+    <a:masterClrMapping/>
+  </p:clrMapOvr>
+</p:notes>
+</file>
+
+<file path=ppt/notesSlides/notesSlide2.xml><?xml version="1.0" encoding="utf-8"?>
+<p:notes xmlns:a="http://schemas.openxmlformats.org/drawingml/2006/main" xmlns:r="http://schemas.openxmlformats.org/officeDocument/2006/relationships" xmlns:p="http://schemas.openxmlformats.org/presentationml/2006/main">
+  <p:cSld>
+    <p:spTree>
+      <p:nvGrpSpPr>
+        <p:cNvPr id="1" name=""/>
+        <p:cNvGrpSpPr/>
+        <p:nvPr/>
+      </p:nvGrpSpPr>
+      <p:grpSpPr>
+        <a:xfrm>
+          <a:off x="0" y="0"/>
+          <a:ext cx="0" cy="0"/>
+          <a:chOff x="0" y="0"/>
+          <a:chExt cx="0" cy="0"/>
+        </a:xfrm>
+      </p:grpSpPr>
+      <p:sp>
+        <p:nvSpPr>
+          <p:cNvPr id="2" name="Slide Image Placeholder 1"/>
+          <p:cNvSpPr>
+            <a:spLocks noGrp="1" noRot="1" noChangeAspect="1"/>
+          </p:cNvSpPr>
+          <p:nvPr>
+            <p:ph type="sldImg"/>
+          </p:nvPr>
+        </p:nvSpPr>
+        <p:spPr/>
+      </p:sp>
+      <p:sp>
+        <p:nvSpPr>
+          <p:cNvPr id="3" name="Notes Placeholder 2"/>
+          <p:cNvSpPr>
+            <a:spLocks noGrp="1"/>
+          </p:cNvSpPr>
+          <p:nvPr>
+            <p:ph type="body" idx="1"/>
+          </p:nvPr>
+        </p:nvSpPr>
+        <p:spPr/>
+        <p:txBody>
+          <a:bodyPr/>
+          <a:lstStyle/>
+          <a:p>
+            <a:r>
+              <a:rPr lang="en-US" dirty="0" smtClean="0"/>
+              <a:t>john</a:t>
+            </a:r>
+            <a:endParaRPr lang="en-US" dirty="0"/>
+          </a:p>
+        </p:txBody>
+      </p:sp>
+      <p:sp>
+        <p:nvSpPr>
+          <p:cNvPr id="4" name="Slide Number Placeholder 3"/>
+          <p:cNvSpPr>
+            <a:spLocks noGrp="1"/>
+          </p:cNvSpPr>
+          <p:nvPr>
+            <p:ph type="sldNum" sz="quarter" idx="10"/>
+          </p:nvPr>
+        </p:nvSpPr>
+        <p:spPr/>
+        <p:txBody>
+          <a:bodyPr/>
+          <a:lstStyle/>
+          <a:p>
+            <a:fld id="{1B8AF91D-EE9F-0F44-B09B-2FDEF4BE7828}" type="slidenum">
+              <a:rPr lang="en-US" smtClean="0"/>
+              <a:t>3</a:t>
+            </a:fld>
+            <a:endParaRPr lang="en-US"/>
+          </a:p>
+        </p:txBody>
+      </p:sp>
+    </p:spTree>
+    <p:extLst>
+      <p:ext uri="{BB962C8B-B14F-4D97-AF65-F5344CB8AC3E}">
+        <p14:creationId xmlns:p14="http://schemas.microsoft.com/office/powerpoint/2010/main" val="797738747"/>
+      </p:ext>
+    </p:extLst>
+  </p:cSld>
+  <p:clrMapOvr>
+    <a:masterClrMapping/>
+  </p:clrMapOvr>
+</p:notes>
+</file>
+
+<file path=ppt/notesSlides/notesSlide3.xml><?xml version="1.0" encoding="utf-8"?>
+<p:notes xmlns:a="http://schemas.openxmlformats.org/drawingml/2006/main" xmlns:r="http://schemas.openxmlformats.org/officeDocument/2006/relationships" xmlns:p="http://schemas.openxmlformats.org/presentationml/2006/main">
+  <p:cSld>
+    <p:spTree>
+      <p:nvGrpSpPr>
+        <p:cNvPr id="1" name=""/>
+        <p:cNvGrpSpPr/>
+        <p:nvPr/>
+      </p:nvGrpSpPr>
+      <p:grpSpPr>
+        <a:xfrm>
+          <a:off x="0" y="0"/>
+          <a:ext cx="0" cy="0"/>
+          <a:chOff x="0" y="0"/>
+          <a:chExt cx="0" cy="0"/>
+        </a:xfrm>
+      </p:grpSpPr>
+      <p:sp>
+        <p:nvSpPr>
+          <p:cNvPr id="2" name="Slide Image Placeholder 1"/>
+          <p:cNvSpPr>
+            <a:spLocks noGrp="1" noRot="1" noChangeAspect="1"/>
+          </p:cNvSpPr>
+          <p:nvPr>
+            <p:ph type="sldImg"/>
+          </p:nvPr>
+        </p:nvSpPr>
+        <p:spPr/>
+      </p:sp>
+      <p:sp>
+        <p:nvSpPr>
+          <p:cNvPr id="3" name="Notes Placeholder 2"/>
+          <p:cNvSpPr>
+            <a:spLocks noGrp="1"/>
+          </p:cNvSpPr>
+          <p:nvPr>
+            <p:ph type="body" idx="1"/>
+          </p:nvPr>
+        </p:nvSpPr>
+        <p:spPr/>
+        <p:txBody>
+          <a:bodyPr/>
+          <a:lstStyle/>
+          <a:p>
+            <a:r>
+              <a:rPr lang="en-US" dirty="0" smtClean="0"/>
+              <a:t>john</a:t>
+            </a:r>
+            <a:endParaRPr lang="en-US" dirty="0"/>
+          </a:p>
+        </p:txBody>
+      </p:sp>
+      <p:sp>
+        <p:nvSpPr>
+          <p:cNvPr id="4" name="Slide Number Placeholder 3"/>
+          <p:cNvSpPr>
+            <a:spLocks noGrp="1"/>
+          </p:cNvSpPr>
+          <p:nvPr>
+            <p:ph type="sldNum" sz="quarter" idx="10"/>
+          </p:nvPr>
+        </p:nvSpPr>
+        <p:spPr/>
+        <p:txBody>
+          <a:bodyPr/>
+          <a:lstStyle/>
+          <a:p>
+            <a:fld id="{1B8AF91D-EE9F-0F44-B09B-2FDEF4BE7828}" type="slidenum">
+              <a:rPr lang="en-US" smtClean="0"/>
+              <a:t>4</a:t>
+            </a:fld>
+            <a:endParaRPr lang="en-US"/>
+          </a:p>
+        </p:txBody>
+      </p:sp>
+    </p:spTree>
+    <p:extLst>
+      <p:ext uri="{BB962C8B-B14F-4D97-AF65-F5344CB8AC3E}">
+        <p14:creationId xmlns:p14="http://schemas.microsoft.com/office/powerpoint/2010/main" val="1305139320"/>
+      </p:ext>
+    </p:extLst>
+  </p:cSld>
+  <p:clrMapOvr>
+    <a:masterClrMapping/>
+  </p:clrMapOvr>
+</p:notes>
+</file>
+
+<file path=ppt/notesSlides/notesSlide4.xml><?xml version="1.0" encoding="utf-8"?>
+<p:notes xmlns:a="http://schemas.openxmlformats.org/drawingml/2006/main" xmlns:r="http://schemas.openxmlformats.org/officeDocument/2006/relationships" xmlns:p="http://schemas.openxmlformats.org/presentationml/2006/main">
+  <p:cSld>
+    <p:spTree>
+      <p:nvGrpSpPr>
+        <p:cNvPr id="1" name=""/>
+        <p:cNvGrpSpPr/>
+        <p:nvPr/>
+      </p:nvGrpSpPr>
+      <p:grpSpPr>
+        <a:xfrm>
+          <a:off x="0" y="0"/>
+          <a:ext cx="0" cy="0"/>
+          <a:chOff x="0" y="0"/>
+          <a:chExt cx="0" cy="0"/>
+        </a:xfrm>
+      </p:grpSpPr>
+      <p:sp>
+        <p:nvSpPr>
+          <p:cNvPr id="2" name="Slide Image Placeholder 1"/>
+          <p:cNvSpPr>
+            <a:spLocks noGrp="1" noRot="1" noChangeAspect="1"/>
+          </p:cNvSpPr>
+          <p:nvPr>
+            <p:ph type="sldImg"/>
+          </p:nvPr>
+        </p:nvSpPr>
+        <p:spPr/>
+      </p:sp>
+      <p:sp>
+        <p:nvSpPr>
+          <p:cNvPr id="3" name="Notes Placeholder 2"/>
+          <p:cNvSpPr>
+            <a:spLocks noGrp="1"/>
+          </p:cNvSpPr>
+          <p:nvPr>
+            <p:ph type="body" idx="1"/>
+          </p:nvPr>
+        </p:nvSpPr>
+        <p:spPr/>
+        <p:txBody>
+          <a:bodyPr/>
+          <a:lstStyle/>
+          <a:p>
+            <a:r>
+              <a:rPr lang="en-US" dirty="0" smtClean="0"/>
+              <a:t>john</a:t>
+            </a:r>
+            <a:endParaRPr lang="en-US" dirty="0"/>
+          </a:p>
+        </p:txBody>
+      </p:sp>
+      <p:sp>
+        <p:nvSpPr>
+          <p:cNvPr id="4" name="Slide Number Placeholder 3"/>
+          <p:cNvSpPr>
+            <a:spLocks noGrp="1"/>
+          </p:cNvSpPr>
+          <p:nvPr>
+            <p:ph type="sldNum" sz="quarter" idx="10"/>
+          </p:nvPr>
+        </p:nvSpPr>
+        <p:spPr/>
+        <p:txBody>
+          <a:bodyPr/>
+          <a:lstStyle/>
+          <a:p>
+            <a:fld id="{1B8AF91D-EE9F-0F44-B09B-2FDEF4BE7828}" type="slidenum">
+              <a:rPr lang="en-US" smtClean="0"/>
+              <a:t>5</a:t>
+            </a:fld>
+            <a:endParaRPr lang="en-US"/>
+          </a:p>
+        </p:txBody>
+      </p:sp>
+    </p:spTree>
+    <p:extLst>
+      <p:ext uri="{BB962C8B-B14F-4D97-AF65-F5344CB8AC3E}">
+        <p14:creationId xmlns:p14="http://schemas.microsoft.com/office/powerpoint/2010/main" val="2030467962"/>
+      </p:ext>
+    </p:extLst>
+  </p:cSld>
+  <p:clrMapOvr>
+    <a:masterClrMapping/>
+  </p:clrMapOvr>
+</p:notes>
+</file>
+
+<file path=ppt/notesSlides/notesSlide5.xml><?xml version="1.0" encoding="utf-8"?>
+<p:notes xmlns:a="http://schemas.openxmlformats.org/drawingml/2006/main" xmlns:r="http://schemas.openxmlformats.org/officeDocument/2006/relationships" xmlns:p="http://schemas.openxmlformats.org/presentationml/2006/main">
+  <p:cSld>
+    <p:spTree>
+      <p:nvGrpSpPr>
+        <p:cNvPr id="1" name=""/>
+        <p:cNvGrpSpPr/>
+        <p:nvPr/>
+      </p:nvGrpSpPr>
+      <p:grpSpPr>
+        <a:xfrm>
+          <a:off x="0" y="0"/>
+          <a:ext cx="0" cy="0"/>
+          <a:chOff x="0" y="0"/>
+          <a:chExt cx="0" cy="0"/>
+        </a:xfrm>
+      </p:grpSpPr>
+      <p:sp>
+        <p:nvSpPr>
+          <p:cNvPr id="2" name="Slide Image Placeholder 1"/>
+          <p:cNvSpPr>
+            <a:spLocks noGrp="1" noRot="1" noChangeAspect="1"/>
+          </p:cNvSpPr>
+          <p:nvPr>
+            <p:ph type="sldImg"/>
+          </p:nvPr>
+        </p:nvSpPr>
+        <p:spPr/>
+      </p:sp>
+      <p:sp>
+        <p:nvSpPr>
+          <p:cNvPr id="3" name="Notes Placeholder 2"/>
+          <p:cNvSpPr>
+            <a:spLocks noGrp="1"/>
+          </p:cNvSpPr>
+          <p:nvPr>
+            <p:ph type="body" idx="1"/>
+          </p:nvPr>
+        </p:nvSpPr>
+        <p:spPr/>
+        <p:txBody>
+          <a:bodyPr/>
+          <a:lstStyle/>
+          <a:p>
+            <a:r>
+              <a:rPr lang="en-US" dirty="0" err="1" smtClean="0"/>
+              <a:t>thomas</a:t>
+            </a:r>
+            <a:endParaRPr lang="en-US" dirty="0"/>
+          </a:p>
+        </p:txBody>
+      </p:sp>
+      <p:sp>
+        <p:nvSpPr>
+          <p:cNvPr id="4" name="Slide Number Placeholder 3"/>
+          <p:cNvSpPr>
+            <a:spLocks noGrp="1"/>
+          </p:cNvSpPr>
+          <p:nvPr>
+            <p:ph type="sldNum" sz="quarter" idx="10"/>
+          </p:nvPr>
+        </p:nvSpPr>
+        <p:spPr/>
+        <p:txBody>
+          <a:bodyPr/>
+          <a:lstStyle/>
+          <a:p>
+            <a:fld id="{1B8AF91D-EE9F-0F44-B09B-2FDEF4BE7828}" type="slidenum">
+              <a:rPr lang="en-US" smtClean="0"/>
+              <a:t>6</a:t>
+            </a:fld>
+            <a:endParaRPr lang="en-US"/>
+          </a:p>
+        </p:txBody>
+      </p:sp>
+    </p:spTree>
+    <p:extLst>
+      <p:ext uri="{BB962C8B-B14F-4D97-AF65-F5344CB8AC3E}">
+        <p14:creationId xmlns:p14="http://schemas.microsoft.com/office/powerpoint/2010/main" val="412402857"/>
+      </p:ext>
+    </p:extLst>
+  </p:cSld>
+  <p:clrMapOvr>
+    <a:masterClrMapping/>
+  </p:clrMapOvr>
+</p:notes>
+</file>
+
+<file path=ppt/notesSlides/notesSlide6.xml><?xml version="1.0" encoding="utf-8"?>
+<p:notes xmlns:a="http://schemas.openxmlformats.org/drawingml/2006/main" xmlns:r="http://schemas.openxmlformats.org/officeDocument/2006/relationships" xmlns:p="http://schemas.openxmlformats.org/presentationml/2006/main">
+  <p:cSld>
+    <p:spTree>
+      <p:nvGrpSpPr>
+        <p:cNvPr id="1" name=""/>
+        <p:cNvGrpSpPr/>
+        <p:nvPr/>
+      </p:nvGrpSpPr>
+      <p:grpSpPr>
+        <a:xfrm>
+          <a:off x="0" y="0"/>
+          <a:ext cx="0" cy="0"/>
+          <a:chOff x="0" y="0"/>
+          <a:chExt cx="0" cy="0"/>
+        </a:xfrm>
+      </p:grpSpPr>
+      <p:sp>
+        <p:nvSpPr>
+          <p:cNvPr id="2" name="Slide Image Placeholder 1"/>
+          <p:cNvSpPr>
+            <a:spLocks noGrp="1" noRot="1" noChangeAspect="1"/>
+          </p:cNvSpPr>
+          <p:nvPr>
+            <p:ph type="sldImg"/>
+          </p:nvPr>
+        </p:nvSpPr>
+        <p:spPr/>
+      </p:sp>
+      <p:sp>
+        <p:nvSpPr>
+          <p:cNvPr id="3" name="Notes Placeholder 2"/>
+          <p:cNvSpPr>
+            <a:spLocks noGrp="1"/>
+          </p:cNvSpPr>
+          <p:nvPr>
+            <p:ph type="body" idx="1"/>
+          </p:nvPr>
+        </p:nvSpPr>
+        <p:spPr/>
+        <p:txBody>
+          <a:bodyPr/>
+          <a:lstStyle/>
+          <a:p>
+            <a:r>
+              <a:rPr lang="en-US" dirty="0" smtClean="0"/>
+              <a:t>john</a:t>
+            </a:r>
+            <a:endParaRPr lang="en-US" dirty="0"/>
+          </a:p>
+        </p:txBody>
+      </p:sp>
+      <p:sp>
+        <p:nvSpPr>
+          <p:cNvPr id="4" name="Slide Number Placeholder 3"/>
+          <p:cNvSpPr>
+            <a:spLocks noGrp="1"/>
+          </p:cNvSpPr>
+          <p:nvPr>
+            <p:ph type="sldNum" sz="quarter" idx="10"/>
+          </p:nvPr>
+        </p:nvSpPr>
+        <p:spPr/>
+        <p:txBody>
+          <a:bodyPr/>
+          <a:lstStyle/>
+          <a:p>
+            <a:fld id="{1B8AF91D-EE9F-0F44-B09B-2FDEF4BE7828}" type="slidenum">
+              <a:rPr lang="en-US" smtClean="0"/>
+              <a:t>7</a:t>
+            </a:fld>
+            <a:endParaRPr lang="en-US"/>
+          </a:p>
+        </p:txBody>
+      </p:sp>
+    </p:spTree>
+    <p:extLst>
+      <p:ext uri="{BB962C8B-B14F-4D97-AF65-F5344CB8AC3E}">
+        <p14:creationId xmlns:p14="http://schemas.microsoft.com/office/powerpoint/2010/main" val="1325088730"/>
+      </p:ext>
+    </p:extLst>
+  </p:cSld>
+  <p:clrMapOvr>
+    <a:masterClrMapping/>
+  </p:clrMapOvr>
+</p:notes>
+</file>
+
 <file path=ppt/slideLayouts/slideLayout1.xml><?xml version="1.0" encoding="utf-8"?>
 <p:sldLayout xmlns:a="http://schemas.openxmlformats.org/drawingml/2006/main" xmlns:r="http://schemas.openxmlformats.org/officeDocument/2006/relationships" xmlns:p="http://schemas.openxmlformats.org/presentationml/2006/main" showMasterSp="0" type="title" preserve="1">
   <p:cSld name="Title Slide">
@@ -4346,7 +5233,7 @@
           <a:p>
             <a:fld id="{0BCE4439-E337-7647-8BE8-4A4D11C1FA42}" type="datetimeFigureOut">
               <a:rPr lang="en-US" smtClean="0"/>
-              <a:t>9/19/2016</a:t>
+              <a:t>9/28/16</a:t>
             </a:fld>
             <a:endParaRPr lang="en-US"/>
           </a:p>
@@ -4670,7 +5557,7 @@
           <a:p>
             <a:fld id="{0BCE4439-E337-7647-8BE8-4A4D11C1FA42}" type="datetimeFigureOut">
               <a:rPr lang="en-US" smtClean="0"/>
-              <a:t>9/19/2016</a:t>
+              <a:t>9/28/16</a:t>
             </a:fld>
             <a:endParaRPr lang="en-US"/>
           </a:p>
@@ -4918,7 +5805,7 @@
           <a:p>
             <a:fld id="{0BCE4439-E337-7647-8BE8-4A4D11C1FA42}" type="datetimeFigureOut">
               <a:rPr lang="en-US" smtClean="0"/>
-              <a:t>9/19/2016</a:t>
+              <a:t>9/28/16</a:t>
             </a:fld>
             <a:endParaRPr lang="en-US"/>
           </a:p>
@@ -5257,7 +6144,7 @@
           <a:p>
             <a:fld id="{0BCE4439-E337-7647-8BE8-4A4D11C1FA42}" type="datetimeFigureOut">
               <a:rPr lang="en-US" smtClean="0"/>
-              <a:t>9/19/2016</a:t>
+              <a:t>9/28/16</a:t>
             </a:fld>
             <a:endParaRPr lang="en-US"/>
           </a:p>
@@ -5604,7 +6491,7 @@
           <a:p>
             <a:fld id="{0BCE4439-E337-7647-8BE8-4A4D11C1FA42}" type="datetimeFigureOut">
               <a:rPr lang="en-US" smtClean="0"/>
-              <a:t>9/19/2016</a:t>
+              <a:t>9/28/16</a:t>
             </a:fld>
             <a:endParaRPr lang="en-US"/>
           </a:p>
@@ -5978,7 +6865,7 @@
           <a:p>
             <a:fld id="{0BCE4439-E337-7647-8BE8-4A4D11C1FA42}" type="datetimeFigureOut">
               <a:rPr lang="en-US" smtClean="0"/>
-              <a:t>9/19/2016</a:t>
+              <a:t>9/28/16</a:t>
             </a:fld>
             <a:endParaRPr lang="en-US"/>
           </a:p>
@@ -6448,7 +7335,7 @@
           <a:p>
             <a:fld id="{0BCE4439-E337-7647-8BE8-4A4D11C1FA42}" type="datetimeFigureOut">
               <a:rPr lang="en-US" smtClean="0"/>
-              <a:t>9/19/2016</a:t>
+              <a:t>9/28/16</a:t>
             </a:fld>
             <a:endParaRPr lang="en-US"/>
           </a:p>
@@ -6653,7 +7540,7 @@
           <a:p>
             <a:fld id="{0BCE4439-E337-7647-8BE8-4A4D11C1FA42}" type="datetimeFigureOut">
               <a:rPr lang="en-US" smtClean="0"/>
-              <a:t>9/19/2016</a:t>
+              <a:t>9/28/16</a:t>
             </a:fld>
             <a:endParaRPr lang="en-US"/>
           </a:p>
@@ -6864,7 +7751,7 @@
           <a:p>
             <a:fld id="{0BCE4439-E337-7647-8BE8-4A4D11C1FA42}" type="datetimeFigureOut">
               <a:rPr lang="en-US" smtClean="0"/>
-              <a:t>9/19/2016</a:t>
+              <a:t>9/28/16</a:t>
             </a:fld>
             <a:endParaRPr lang="en-US"/>
           </a:p>
@@ -7096,7 +7983,7 @@
           <a:p>
             <a:fld id="{0BCE4439-E337-7647-8BE8-4A4D11C1FA42}" type="datetimeFigureOut">
               <a:rPr lang="en-US" smtClean="0"/>
-              <a:t>9/19/2016</a:t>
+              <a:t>9/28/16</a:t>
             </a:fld>
             <a:endParaRPr lang="en-US"/>
           </a:p>
@@ -7344,7 +8231,7 @@
           <a:p>
             <a:fld id="{0BCE4439-E337-7647-8BE8-4A4D11C1FA42}" type="datetimeFigureOut">
               <a:rPr lang="en-US" smtClean="0"/>
-              <a:t>9/19/2016</a:t>
+              <a:t>9/28/16</a:t>
             </a:fld>
             <a:endParaRPr lang="en-US"/>
           </a:p>
@@ -7642,7 +8529,7 @@
           <a:p>
             <a:fld id="{0BCE4439-E337-7647-8BE8-4A4D11C1FA42}" type="datetimeFigureOut">
               <a:rPr lang="en-US" smtClean="0"/>
-              <a:t>9/19/2016</a:t>
+              <a:t>9/28/16</a:t>
             </a:fld>
             <a:endParaRPr lang="en-US"/>
           </a:p>
@@ -8036,7 +8923,7 @@
           <a:p>
             <a:fld id="{0BCE4439-E337-7647-8BE8-4A4D11C1FA42}" type="datetimeFigureOut">
               <a:rPr lang="en-US" smtClean="0"/>
-              <a:t>9/19/2016</a:t>
+              <a:t>9/28/16</a:t>
             </a:fld>
             <a:endParaRPr lang="en-US"/>
           </a:p>
@@ -8185,7 +9072,7 @@
           <a:p>
             <a:fld id="{0BCE4439-E337-7647-8BE8-4A4D11C1FA42}" type="datetimeFigureOut">
               <a:rPr lang="en-US" smtClean="0"/>
-              <a:t>9/19/2016</a:t>
+              <a:t>9/28/16</a:t>
             </a:fld>
             <a:endParaRPr lang="en-US"/>
           </a:p>
@@ -8311,7 +9198,7 @@
           <a:p>
             <a:fld id="{0BCE4439-E337-7647-8BE8-4A4D11C1FA42}" type="datetimeFigureOut">
               <a:rPr lang="en-US" smtClean="0"/>
-              <a:t>9/19/2016</a:t>
+              <a:t>9/28/16</a:t>
             </a:fld>
             <a:endParaRPr lang="en-US"/>
           </a:p>
@@ -8566,7 +9453,7 @@
           <a:p>
             <a:fld id="{0BCE4439-E337-7647-8BE8-4A4D11C1FA42}" type="datetimeFigureOut">
               <a:rPr lang="en-US" smtClean="0"/>
-              <a:t>9/19/2016</a:t>
+              <a:t>9/28/16</a:t>
             </a:fld>
             <a:endParaRPr lang="en-US"/>
           </a:p>
@@ -8881,7 +9768,7 @@
           <a:p>
             <a:fld id="{0BCE4439-E337-7647-8BE8-4A4D11C1FA42}" type="datetimeFigureOut">
               <a:rPr lang="en-US" smtClean="0"/>
-              <a:t>9/19/2016</a:t>
+              <a:t>9/28/16</a:t>
             </a:fld>
             <a:endParaRPr lang="en-US"/>
           </a:p>
@@ -9232,7 +10119,7 @@
           <a:p>
             <a:fld id="{0BCE4439-E337-7647-8BE8-4A4D11C1FA42}" type="datetimeFigureOut">
               <a:rPr lang="en-US" smtClean="0"/>
-              <a:t>9/19/2016</a:t>
+              <a:t>9/28/16</a:t>
             </a:fld>
             <a:endParaRPr lang="en-US"/>
           </a:p>
@@ -9842,6 +10729,13 @@
   <p:clrMapOvr>
     <a:masterClrMapping/>
   </p:clrMapOvr>
+  <p:timing>
+    <p:tnLst>
+      <p:par>
+        <p:cTn id="1" dur="indefinite" restart="never" nodeType="tmRoot"/>
+      </p:par>
+    </p:tnLst>
+  </p:timing>
 </p:sld>
 </file>
 
@@ -9955,6 +10849,333 @@
   <p:clrMapOvr>
     <a:masterClrMapping/>
   </p:clrMapOvr>
+  <p:timing>
+    <p:tnLst>
+      <p:par>
+        <p:cTn id="1" dur="indefinite" restart="never" nodeType="tmRoot">
+          <p:childTnLst>
+            <p:seq concurrent="1" nextAc="seek">
+              <p:cTn id="2" dur="indefinite" nodeType="mainSeq">
+                <p:childTnLst>
+                  <p:par>
+                    <p:cTn id="3" fill="hold">
+                      <p:stCondLst>
+                        <p:cond delay="indefinite"/>
+                      </p:stCondLst>
+                      <p:childTnLst>
+                        <p:par>
+                          <p:cTn id="4" fill="hold">
+                            <p:stCondLst>
+                              <p:cond delay="0"/>
+                            </p:stCondLst>
+                            <p:childTnLst>
+                              <p:par>
+                                <p:cTn id="5" presetID="1" presetClass="entr" presetSubtype="0" fill="hold" grpId="0" nodeType="clickEffect">
+                                  <p:stCondLst>
+                                    <p:cond delay="0"/>
+                                  </p:stCondLst>
+                                  <p:childTnLst>
+                                    <p:set>
+                                      <p:cBhvr>
+                                        <p:cTn id="6" dur="1" fill="hold">
+                                          <p:stCondLst>
+                                            <p:cond delay="0"/>
+                                          </p:stCondLst>
+                                        </p:cTn>
+                                        <p:tgtEl>
+                                          <p:spTgt spid="3">
+                                            <p:txEl>
+                                              <p:pRg st="0" end="0"/>
+                                            </p:txEl>
+                                          </p:spTgt>
+                                        </p:tgtEl>
+                                        <p:attrNameLst>
+                                          <p:attrName>style.visibility</p:attrName>
+                                        </p:attrNameLst>
+                                      </p:cBhvr>
+                                      <p:to>
+                                        <p:strVal val="visible"/>
+                                      </p:to>
+                                    </p:set>
+                                  </p:childTnLst>
+                                </p:cTn>
+                              </p:par>
+                            </p:childTnLst>
+                          </p:cTn>
+                        </p:par>
+                      </p:childTnLst>
+                    </p:cTn>
+                  </p:par>
+                  <p:par>
+                    <p:cTn id="7" fill="hold">
+                      <p:stCondLst>
+                        <p:cond delay="indefinite"/>
+                      </p:stCondLst>
+                      <p:childTnLst>
+                        <p:par>
+                          <p:cTn id="8" fill="hold">
+                            <p:stCondLst>
+                              <p:cond delay="0"/>
+                            </p:stCondLst>
+                            <p:childTnLst>
+                              <p:par>
+                                <p:cTn id="9" presetID="1" presetClass="entr" presetSubtype="0" fill="hold" grpId="0" nodeType="clickEffect">
+                                  <p:stCondLst>
+                                    <p:cond delay="0"/>
+                                  </p:stCondLst>
+                                  <p:childTnLst>
+                                    <p:set>
+                                      <p:cBhvr>
+                                        <p:cTn id="10" dur="1" fill="hold">
+                                          <p:stCondLst>
+                                            <p:cond delay="0"/>
+                                          </p:stCondLst>
+                                        </p:cTn>
+                                        <p:tgtEl>
+                                          <p:spTgt spid="3">
+                                            <p:txEl>
+                                              <p:pRg st="1" end="1"/>
+                                            </p:txEl>
+                                          </p:spTgt>
+                                        </p:tgtEl>
+                                        <p:attrNameLst>
+                                          <p:attrName>style.visibility</p:attrName>
+                                        </p:attrNameLst>
+                                      </p:cBhvr>
+                                      <p:to>
+                                        <p:strVal val="visible"/>
+                                      </p:to>
+                                    </p:set>
+                                  </p:childTnLst>
+                                </p:cTn>
+                              </p:par>
+                            </p:childTnLst>
+                          </p:cTn>
+                        </p:par>
+                      </p:childTnLst>
+                    </p:cTn>
+                  </p:par>
+                  <p:par>
+                    <p:cTn id="11" fill="hold">
+                      <p:stCondLst>
+                        <p:cond delay="indefinite"/>
+                      </p:stCondLst>
+                      <p:childTnLst>
+                        <p:par>
+                          <p:cTn id="12" fill="hold">
+                            <p:stCondLst>
+                              <p:cond delay="0"/>
+                            </p:stCondLst>
+                            <p:childTnLst>
+                              <p:par>
+                                <p:cTn id="13" presetID="1" presetClass="entr" presetSubtype="0" fill="hold" grpId="0" nodeType="clickEffect">
+                                  <p:stCondLst>
+                                    <p:cond delay="0"/>
+                                  </p:stCondLst>
+                                  <p:childTnLst>
+                                    <p:set>
+                                      <p:cBhvr>
+                                        <p:cTn id="14" dur="1" fill="hold">
+                                          <p:stCondLst>
+                                            <p:cond delay="0"/>
+                                          </p:stCondLst>
+                                        </p:cTn>
+                                        <p:tgtEl>
+                                          <p:spTgt spid="3">
+                                            <p:txEl>
+                                              <p:pRg st="2" end="2"/>
+                                            </p:txEl>
+                                          </p:spTgt>
+                                        </p:tgtEl>
+                                        <p:attrNameLst>
+                                          <p:attrName>style.visibility</p:attrName>
+                                        </p:attrNameLst>
+                                      </p:cBhvr>
+                                      <p:to>
+                                        <p:strVal val="visible"/>
+                                      </p:to>
+                                    </p:set>
+                                  </p:childTnLst>
+                                </p:cTn>
+                              </p:par>
+                            </p:childTnLst>
+                          </p:cTn>
+                        </p:par>
+                      </p:childTnLst>
+                    </p:cTn>
+                  </p:par>
+                  <p:par>
+                    <p:cTn id="15" fill="hold">
+                      <p:stCondLst>
+                        <p:cond delay="indefinite"/>
+                      </p:stCondLst>
+                      <p:childTnLst>
+                        <p:par>
+                          <p:cTn id="16" fill="hold">
+                            <p:stCondLst>
+                              <p:cond delay="0"/>
+                            </p:stCondLst>
+                            <p:childTnLst>
+                              <p:par>
+                                <p:cTn id="17" presetID="1" presetClass="entr" presetSubtype="0" fill="hold" grpId="0" nodeType="clickEffect">
+                                  <p:stCondLst>
+                                    <p:cond delay="0"/>
+                                  </p:stCondLst>
+                                  <p:childTnLst>
+                                    <p:set>
+                                      <p:cBhvr>
+                                        <p:cTn id="18" dur="1" fill="hold">
+                                          <p:stCondLst>
+                                            <p:cond delay="0"/>
+                                          </p:stCondLst>
+                                        </p:cTn>
+                                        <p:tgtEl>
+                                          <p:spTgt spid="3">
+                                            <p:txEl>
+                                              <p:pRg st="3" end="3"/>
+                                            </p:txEl>
+                                          </p:spTgt>
+                                        </p:tgtEl>
+                                        <p:attrNameLst>
+                                          <p:attrName>style.visibility</p:attrName>
+                                        </p:attrNameLst>
+                                      </p:cBhvr>
+                                      <p:to>
+                                        <p:strVal val="visible"/>
+                                      </p:to>
+                                    </p:set>
+                                  </p:childTnLst>
+                                </p:cTn>
+                              </p:par>
+                            </p:childTnLst>
+                          </p:cTn>
+                        </p:par>
+                      </p:childTnLst>
+                    </p:cTn>
+                  </p:par>
+                  <p:par>
+                    <p:cTn id="19" fill="hold">
+                      <p:stCondLst>
+                        <p:cond delay="indefinite"/>
+                      </p:stCondLst>
+                      <p:childTnLst>
+                        <p:par>
+                          <p:cTn id="20" fill="hold">
+                            <p:stCondLst>
+                              <p:cond delay="0"/>
+                            </p:stCondLst>
+                            <p:childTnLst>
+                              <p:par>
+                                <p:cTn id="21" presetID="1" presetClass="entr" presetSubtype="0" fill="hold" grpId="0" nodeType="clickEffect">
+                                  <p:stCondLst>
+                                    <p:cond delay="0"/>
+                                  </p:stCondLst>
+                                  <p:childTnLst>
+                                    <p:set>
+                                      <p:cBhvr>
+                                        <p:cTn id="22" dur="1" fill="hold">
+                                          <p:stCondLst>
+                                            <p:cond delay="0"/>
+                                          </p:stCondLst>
+                                        </p:cTn>
+                                        <p:tgtEl>
+                                          <p:spTgt spid="3">
+                                            <p:txEl>
+                                              <p:pRg st="4" end="4"/>
+                                            </p:txEl>
+                                          </p:spTgt>
+                                        </p:tgtEl>
+                                        <p:attrNameLst>
+                                          <p:attrName>style.visibility</p:attrName>
+                                        </p:attrNameLst>
+                                      </p:cBhvr>
+                                      <p:to>
+                                        <p:strVal val="visible"/>
+                                      </p:to>
+                                    </p:set>
+                                  </p:childTnLst>
+                                </p:cTn>
+                              </p:par>
+                            </p:childTnLst>
+                          </p:cTn>
+                        </p:par>
+                      </p:childTnLst>
+                    </p:cTn>
+                  </p:par>
+                  <p:par>
+                    <p:cTn id="23" fill="hold">
+                      <p:stCondLst>
+                        <p:cond delay="indefinite"/>
+                      </p:stCondLst>
+                      <p:childTnLst>
+                        <p:par>
+                          <p:cTn id="24" fill="hold">
+                            <p:stCondLst>
+                              <p:cond delay="0"/>
+                            </p:stCondLst>
+                            <p:childTnLst>
+                              <p:par>
+                                <p:cTn id="25" presetID="1" presetClass="entr" presetSubtype="0" fill="hold" grpId="0" nodeType="clickEffect">
+                                  <p:stCondLst>
+                                    <p:cond delay="0"/>
+                                  </p:stCondLst>
+                                  <p:childTnLst>
+                                    <p:set>
+                                      <p:cBhvr>
+                                        <p:cTn id="26" dur="1" fill="hold">
+                                          <p:stCondLst>
+                                            <p:cond delay="0"/>
+                                          </p:stCondLst>
+                                        </p:cTn>
+                                        <p:tgtEl>
+                                          <p:spTgt spid="3">
+                                            <p:txEl>
+                                              <p:pRg st="5" end="5"/>
+                                            </p:txEl>
+                                          </p:spTgt>
+                                        </p:tgtEl>
+                                        <p:attrNameLst>
+                                          <p:attrName>style.visibility</p:attrName>
+                                        </p:attrNameLst>
+                                      </p:cBhvr>
+                                      <p:to>
+                                        <p:strVal val="visible"/>
+                                      </p:to>
+                                    </p:set>
+                                  </p:childTnLst>
+                                </p:cTn>
+                              </p:par>
+                            </p:childTnLst>
+                          </p:cTn>
+                        </p:par>
+                      </p:childTnLst>
+                    </p:cTn>
+                  </p:par>
+                </p:childTnLst>
+              </p:cTn>
+              <p:prevCondLst>
+                <p:cond evt="onPrev" delay="0">
+                  <p:tgtEl>
+                    <p:sldTgt/>
+                  </p:tgtEl>
+                </p:cond>
+              </p:prevCondLst>
+              <p:nextCondLst>
+                <p:cond evt="onNext" delay="0">
+                  <p:tgtEl>
+                    <p:sldTgt/>
+                  </p:tgtEl>
+                </p:cond>
+              </p:nextCondLst>
+            </p:seq>
+          </p:childTnLst>
+        </p:cTn>
+      </p:par>
+    </p:tnLst>
+    <p:bldLst>
+      <p:bldP spid="3" grpId="0" build="p"/>
+    </p:bldLst>
+  </p:timing>
 </p:sld>
 </file>
 
@@ -10009,7 +11230,7 @@
           </p:nvPr>
         </p:nvPicPr>
         <p:blipFill>
-          <a:blip r:embed="rId2">
+          <a:blip r:embed="rId3">
             <a:extLst>
               <a:ext uri="{28A0092B-C50C-407E-A947-70E740481C1C}">
                 <a14:useLocalDpi xmlns:a14="http://schemas.microsoft.com/office/drawing/2010/main" val="0"/>
@@ -10027,163 +11248,116 @@
           </a:xfrm>
         </p:spPr>
       </p:pic>
-      <p:cxnSp>
-        <p:nvCxnSpPr>
-          <p:cNvPr id="8" name="Elbow Connector 7"/>
-          <p:cNvCxnSpPr>
-            <a:stCxn id="15" idx="3"/>
-          </p:cNvCxnSpPr>
+      <p:grpSp>
+        <p:nvGrpSpPr>
+          <p:cNvPr id="3" name="Group 2"/>
+          <p:cNvGrpSpPr/>
           <p:nvPr/>
-        </p:nvCxnSpPr>
-        <p:spPr>
-          <a:xfrm>
-            <a:off x="3624886" y="3068843"/>
-            <a:ext cx="2351965" cy="1079210"/>
-          </a:xfrm>
-          <a:prstGeom prst="bentConnector3">
-            <a:avLst/>
-          </a:prstGeom>
-          <a:ln w="38100">
-            <a:solidFill>
-              <a:schemeClr val="accent6"/>
-            </a:solidFill>
-            <a:tailEnd type="triangle"/>
-          </a:ln>
-        </p:spPr>
-        <p:style>
-          <a:lnRef idx="1">
-            <a:schemeClr val="accent1"/>
-          </a:lnRef>
-          <a:fillRef idx="0">
-            <a:schemeClr val="accent1"/>
-          </a:fillRef>
-          <a:effectRef idx="0">
-            <a:schemeClr val="accent1"/>
-          </a:effectRef>
-          <a:fontRef idx="minor">
-            <a:schemeClr val="tx1"/>
-          </a:fontRef>
-        </p:style>
-      </p:cxnSp>
-      <p:cxnSp>
-        <p:nvCxnSpPr>
-          <p:cNvPr id="10" name="Elbow Connector 9"/>
-          <p:cNvCxnSpPr>
-            <a:stCxn id="16" idx="1"/>
-          </p:cNvCxnSpPr>
-          <p:nvPr/>
-        </p:nvCxnSpPr>
-        <p:spPr>
-          <a:xfrm rot="10800000" flipV="1">
-            <a:off x="6758249" y="3119230"/>
-            <a:ext cx="1462932" cy="870878"/>
-          </a:xfrm>
-          <a:prstGeom prst="bentConnector3">
-            <a:avLst>
-              <a:gd name="adj1" fmla="val 50000"/>
-            </a:avLst>
-          </a:prstGeom>
-          <a:ln w="38100">
-            <a:solidFill>
-              <a:schemeClr val="accent6"/>
-            </a:solidFill>
-            <a:tailEnd type="triangle"/>
-          </a:ln>
-        </p:spPr>
-        <p:style>
-          <a:lnRef idx="1">
-            <a:schemeClr val="accent1"/>
-          </a:lnRef>
-          <a:fillRef idx="0">
-            <a:schemeClr val="accent1"/>
-          </a:fillRef>
-          <a:effectRef idx="0">
-            <a:schemeClr val="accent1"/>
-          </a:effectRef>
-          <a:fontRef idx="minor">
-            <a:schemeClr val="tx1"/>
-          </a:fontRef>
-        </p:style>
-      </p:cxnSp>
-      <p:cxnSp>
-        <p:nvCxnSpPr>
-          <p:cNvPr id="12" name="Straight Arrow Connector 11"/>
-          <p:cNvCxnSpPr/>
-          <p:nvPr/>
-        </p:nvCxnSpPr>
-        <p:spPr>
-          <a:xfrm flipH="1">
-            <a:off x="5976851" y="4713316"/>
-            <a:ext cx="2244329" cy="0"/>
-          </a:xfrm>
-          <a:prstGeom prst="straightConnector1">
-            <a:avLst/>
-          </a:prstGeom>
-          <a:ln w="38100">
-            <a:solidFill>
-              <a:schemeClr val="accent6"/>
-            </a:solidFill>
-            <a:tailEnd type="triangle"/>
-          </a:ln>
-        </p:spPr>
-        <p:style>
-          <a:lnRef idx="1">
-            <a:schemeClr val="accent1"/>
-          </a:lnRef>
-          <a:fillRef idx="0">
-            <a:schemeClr val="accent1"/>
-          </a:fillRef>
-          <a:effectRef idx="0">
-            <a:schemeClr val="accent1"/>
-          </a:effectRef>
-          <a:fontRef idx="minor">
-            <a:schemeClr val="tx1"/>
-          </a:fontRef>
-        </p:style>
-      </p:cxnSp>
-      <p:sp>
-        <p:nvSpPr>
-          <p:cNvPr id="15" name="Rectangle 14"/>
-          <p:cNvSpPr/>
-          <p:nvPr/>
-        </p:nvSpPr>
-        <p:spPr>
+        </p:nvGrpSpPr>
+        <p:grpSpPr>
           <a:xfrm>
             <a:off x="1295402" y="2776455"/>
-            <a:ext cx="2329484" cy="584775"/>
+            <a:ext cx="4681449" cy="1371598"/>
+            <a:chOff x="1295402" y="2776455"/>
+            <a:chExt cx="4681449" cy="1371598"/>
           </a:xfrm>
-          <a:prstGeom prst="rect">
-            <a:avLst/>
-          </a:prstGeom>
-          <a:ln>
-            <a:solidFill>
+        </p:grpSpPr>
+        <p:cxnSp>
+          <p:nvCxnSpPr>
+            <p:cNvPr id="8" name="Elbow Connector 7"/>
+            <p:cNvCxnSpPr>
+              <a:stCxn id="15" idx="3"/>
+            </p:cNvCxnSpPr>
+            <p:nvPr/>
+          </p:nvCxnSpPr>
+          <p:spPr>
+            <a:xfrm>
+              <a:off x="3624886" y="3068843"/>
+              <a:ext cx="2351965" cy="1079210"/>
+            </a:xfrm>
+            <a:prstGeom prst="bentConnector3">
+              <a:avLst/>
+            </a:prstGeom>
+            <a:ln w="38100">
+              <a:solidFill>
+                <a:schemeClr val="accent6"/>
+              </a:solidFill>
+              <a:tailEnd type="triangle"/>
+            </a:ln>
+          </p:spPr>
+          <p:style>
+            <a:lnRef idx="1">
+              <a:schemeClr val="accent1"/>
+            </a:lnRef>
+            <a:fillRef idx="0">
+              <a:schemeClr val="accent1"/>
+            </a:fillRef>
+            <a:effectRef idx="0">
+              <a:schemeClr val="accent1"/>
+            </a:effectRef>
+            <a:fontRef idx="minor">
+              <a:schemeClr val="tx1"/>
+            </a:fontRef>
+          </p:style>
+        </p:cxnSp>
+        <p:sp>
+          <p:nvSpPr>
+            <p:cNvPr id="15" name="Rectangle 14"/>
+            <p:cNvSpPr/>
+            <p:nvPr/>
+          </p:nvSpPr>
+          <p:spPr>
+            <a:xfrm>
+              <a:off x="1295402" y="2776455"/>
+              <a:ext cx="2329484" cy="584775"/>
+            </a:xfrm>
+            <a:prstGeom prst="rect">
+              <a:avLst/>
+            </a:prstGeom>
+            <a:ln>
+              <a:solidFill>
+                <a:schemeClr val="accent6"/>
+              </a:solidFill>
+            </a:ln>
+          </p:spPr>
+          <p:style>
+            <a:lnRef idx="2">
               <a:schemeClr val="accent6"/>
-            </a:solidFill>
-          </a:ln>
-        </p:spPr>
-        <p:style>
-          <a:lnRef idx="2">
-            <a:schemeClr val="accent6"/>
-          </a:lnRef>
-          <a:fillRef idx="1">
-            <a:schemeClr val="lt1"/>
-          </a:fillRef>
-          <a:effectRef idx="0">
-            <a:schemeClr val="accent6"/>
-          </a:effectRef>
-          <a:fontRef idx="minor">
-            <a:schemeClr val="dk1"/>
-          </a:fontRef>
-        </p:style>
-        <p:txBody>
-          <a:bodyPr wrap="square" lIns="91440" tIns="45720" rIns="91440" bIns="45720">
-            <a:spAutoFit/>
-          </a:bodyPr>
-          <a:lstStyle/>
-          <a:p>
-            <a:pPr algn="ctr"/>
-            <a:r>
-              <a:rPr lang="en-US" sz="3200" dirty="0" smtClean="0">
+            </a:lnRef>
+            <a:fillRef idx="1">
+              <a:schemeClr val="lt1"/>
+            </a:fillRef>
+            <a:effectRef idx="0">
+              <a:schemeClr val="accent6"/>
+            </a:effectRef>
+            <a:fontRef idx="minor">
+              <a:schemeClr val="dk1"/>
+            </a:fontRef>
+          </p:style>
+          <p:txBody>
+            <a:bodyPr wrap="square" lIns="91440" tIns="45720" rIns="91440" bIns="45720">
+              <a:spAutoFit/>
+            </a:bodyPr>
+            <a:lstStyle/>
+            <a:p>
+              <a:pPr algn="ctr"/>
+              <a:r>
+                <a:rPr lang="en-US" sz="3200" dirty="0" smtClean="0">
+                  <a:ln w="0"/>
+                  <a:solidFill>
+                    <a:schemeClr val="tx1"/>
+                  </a:solidFill>
+                  <a:effectLst>
+                    <a:outerShdw blurRad="38100" dist="19050" dir="2700000" algn="tl" rotWithShape="0">
+                      <a:schemeClr val="dk1">
+                        <a:alpha val="40000"/>
+                      </a:schemeClr>
+                    </a:outerShdw>
+                  </a:effectLst>
+                </a:rPr>
+                <a:t>Solar panels</a:t>
+              </a:r>
+              <a:endParaRPr lang="en-US" sz="3200" dirty="0">
                 <a:ln w="0"/>
                 <a:solidFill>
                   <a:schemeClr val="tx1"/>
@@ -10195,231 +11369,323 @@
                     </a:schemeClr>
                   </a:outerShdw>
                 </a:effectLst>
-              </a:rPr>
-              <a:t>Solar panels</a:t>
-            </a:r>
-            <a:endParaRPr lang="en-US" sz="3200" dirty="0">
-              <a:ln w="0"/>
+              </a:endParaRPr>
+            </a:p>
+          </p:txBody>
+        </p:sp>
+      </p:grpSp>
+      <p:grpSp>
+        <p:nvGrpSpPr>
+          <p:cNvPr id="5" name="Group 4"/>
+          <p:cNvGrpSpPr/>
+          <p:nvPr/>
+        </p:nvGrpSpPr>
+        <p:grpSpPr>
+          <a:xfrm>
+            <a:off x="6758249" y="2580621"/>
+            <a:ext cx="4257764" cy="1409487"/>
+            <a:chOff x="6758249" y="2580621"/>
+            <a:chExt cx="4257764" cy="1409487"/>
+          </a:xfrm>
+        </p:grpSpPr>
+        <p:cxnSp>
+          <p:nvCxnSpPr>
+            <p:cNvPr id="10" name="Elbow Connector 9"/>
+            <p:cNvCxnSpPr>
+              <a:stCxn id="16" idx="1"/>
+            </p:cNvCxnSpPr>
+            <p:nvPr/>
+          </p:nvCxnSpPr>
+          <p:spPr>
+            <a:xfrm rot="10800000" flipV="1">
+              <a:off x="6758249" y="3119230"/>
+              <a:ext cx="1462932" cy="870878"/>
+            </a:xfrm>
+            <a:prstGeom prst="bentConnector3">
+              <a:avLst>
+                <a:gd name="adj1" fmla="val 50000"/>
+              </a:avLst>
+            </a:prstGeom>
+            <a:ln w="38100">
               <a:solidFill>
-                <a:schemeClr val="tx1"/>
+                <a:schemeClr val="accent6"/>
               </a:solidFill>
-              <a:effectLst>
-                <a:outerShdw blurRad="38100" dist="19050" dir="2700000" algn="tl" rotWithShape="0">
-                  <a:schemeClr val="dk1">
-                    <a:alpha val="40000"/>
-                  </a:schemeClr>
-                </a:outerShdw>
-              </a:effectLst>
-            </a:endParaRPr>
-          </a:p>
-        </p:txBody>
-      </p:sp>
-      <p:sp>
-        <p:nvSpPr>
-          <p:cNvPr id="16" name="Rectangle 15"/>
-          <p:cNvSpPr/>
+              <a:tailEnd type="triangle"/>
+            </a:ln>
+          </p:spPr>
+          <p:style>
+            <a:lnRef idx="1">
+              <a:schemeClr val="accent1"/>
+            </a:lnRef>
+            <a:fillRef idx="0">
+              <a:schemeClr val="accent1"/>
+            </a:fillRef>
+            <a:effectRef idx="0">
+              <a:schemeClr val="accent1"/>
+            </a:effectRef>
+            <a:fontRef idx="minor">
+              <a:schemeClr val="tx1"/>
+            </a:fontRef>
+          </p:style>
+        </p:cxnSp>
+        <p:sp>
+          <p:nvSpPr>
+            <p:cNvPr id="16" name="Rectangle 15"/>
+            <p:cNvSpPr/>
+            <p:nvPr/>
+          </p:nvSpPr>
+          <p:spPr>
+            <a:xfrm>
+              <a:off x="8221181" y="2580621"/>
+              <a:ext cx="2794832" cy="1077218"/>
+            </a:xfrm>
+            <a:prstGeom prst="rect">
+              <a:avLst/>
+            </a:prstGeom>
+            <a:ln>
+              <a:solidFill>
+                <a:schemeClr val="accent6"/>
+              </a:solidFill>
+            </a:ln>
+          </p:spPr>
+          <p:style>
+            <a:lnRef idx="2">
+              <a:schemeClr val="accent6"/>
+            </a:lnRef>
+            <a:fillRef idx="1">
+              <a:schemeClr val="lt1"/>
+            </a:fillRef>
+            <a:effectRef idx="0">
+              <a:schemeClr val="accent6"/>
+            </a:effectRef>
+            <a:fontRef idx="minor">
+              <a:schemeClr val="dk1"/>
+            </a:fontRef>
+          </p:style>
+          <p:txBody>
+            <a:bodyPr wrap="square" lIns="91440" tIns="45720" rIns="91440" bIns="45720">
+              <a:spAutoFit/>
+            </a:bodyPr>
+            <a:lstStyle/>
+            <a:p>
+              <a:pPr algn="ctr"/>
+              <a:r>
+                <a:rPr lang="en-US" sz="3200" dirty="0">
+                  <a:ln w="0"/>
+                  <a:solidFill>
+                    <a:schemeClr val="tx1"/>
+                  </a:solidFill>
+                  <a:effectLst>
+                    <a:outerShdw blurRad="38100" dist="19050" dir="2700000" algn="tl" rotWithShape="0">
+                      <a:schemeClr val="dk1">
+                        <a:alpha val="40000"/>
+                      </a:schemeClr>
+                    </a:outerShdw>
+                  </a:effectLst>
+                </a:rPr>
+                <a:t>Waterproof</a:t>
+              </a:r>
+            </a:p>
+            <a:p>
+              <a:pPr algn="ctr"/>
+              <a:r>
+                <a:rPr lang="en-US" sz="3200" dirty="0">
+                  <a:ln w="0"/>
+                  <a:solidFill>
+                    <a:schemeClr val="tx1"/>
+                  </a:solidFill>
+                  <a:effectLst>
+                    <a:outerShdw blurRad="38100" dist="19050" dir="2700000" algn="tl" rotWithShape="0">
+                      <a:schemeClr val="dk1">
+                        <a:alpha val="40000"/>
+                      </a:schemeClr>
+                    </a:outerShdw>
+                  </a:effectLst>
+                </a:rPr>
+                <a:t>ABS plastic</a:t>
+              </a:r>
+            </a:p>
+          </p:txBody>
+        </p:sp>
+      </p:grpSp>
+      <p:grpSp>
+        <p:nvGrpSpPr>
+          <p:cNvPr id="6" name="Group 5"/>
+          <p:cNvGrpSpPr/>
           <p:nvPr/>
-        </p:nvSpPr>
-        <p:spPr>
+        </p:nvGrpSpPr>
+        <p:grpSpPr>
           <a:xfrm>
-            <a:off x="8221181" y="2580621"/>
-            <a:ext cx="2794832" cy="1077218"/>
+            <a:off x="5976851" y="4284729"/>
+            <a:ext cx="5039162" cy="1077218"/>
+            <a:chOff x="5976851" y="4284729"/>
+            <a:chExt cx="5039162" cy="1077218"/>
           </a:xfrm>
-          <a:prstGeom prst="rect">
-            <a:avLst/>
-          </a:prstGeom>
-          <a:ln>
-            <a:solidFill>
+        </p:grpSpPr>
+        <p:cxnSp>
+          <p:nvCxnSpPr>
+            <p:cNvPr id="12" name="Straight Arrow Connector 11"/>
+            <p:cNvCxnSpPr/>
+            <p:nvPr/>
+          </p:nvCxnSpPr>
+          <p:spPr>
+            <a:xfrm flipH="1">
+              <a:off x="5976851" y="4713316"/>
+              <a:ext cx="2244329" cy="0"/>
+            </a:xfrm>
+            <a:prstGeom prst="straightConnector1">
+              <a:avLst/>
+            </a:prstGeom>
+            <a:ln w="38100">
+              <a:solidFill>
+                <a:schemeClr val="accent6"/>
+              </a:solidFill>
+              <a:tailEnd type="triangle"/>
+            </a:ln>
+          </p:spPr>
+          <p:style>
+            <a:lnRef idx="1">
+              <a:schemeClr val="accent1"/>
+            </a:lnRef>
+            <a:fillRef idx="0">
+              <a:schemeClr val="accent1"/>
+            </a:fillRef>
+            <a:effectRef idx="0">
+              <a:schemeClr val="accent1"/>
+            </a:effectRef>
+            <a:fontRef idx="minor">
+              <a:schemeClr val="tx1"/>
+            </a:fontRef>
+          </p:style>
+        </p:cxnSp>
+        <p:sp>
+          <p:nvSpPr>
+            <p:cNvPr id="17" name="Rectangle 16"/>
+            <p:cNvSpPr/>
+            <p:nvPr/>
+          </p:nvSpPr>
+          <p:spPr>
+            <a:xfrm>
+              <a:off x="8221180" y="4284729"/>
+              <a:ext cx="2794833" cy="1077218"/>
+            </a:xfrm>
+            <a:prstGeom prst="rect">
+              <a:avLst/>
+            </a:prstGeom>
+            <a:ln>
+              <a:solidFill>
+                <a:schemeClr val="accent6"/>
+              </a:solidFill>
+            </a:ln>
+          </p:spPr>
+          <p:style>
+            <a:lnRef idx="2">
               <a:schemeClr val="accent6"/>
-            </a:solidFill>
-          </a:ln>
-        </p:spPr>
-        <p:style>
-          <a:lnRef idx="2">
-            <a:schemeClr val="accent6"/>
-          </a:lnRef>
-          <a:fillRef idx="1">
-            <a:schemeClr val="lt1"/>
-          </a:fillRef>
-          <a:effectRef idx="0">
-            <a:schemeClr val="accent6"/>
-          </a:effectRef>
-          <a:fontRef idx="minor">
-            <a:schemeClr val="dk1"/>
-          </a:fontRef>
-        </p:style>
-        <p:txBody>
-          <a:bodyPr wrap="square" lIns="91440" tIns="45720" rIns="91440" bIns="45720">
-            <a:spAutoFit/>
-          </a:bodyPr>
-          <a:lstStyle/>
-          <a:p>
-            <a:pPr algn="ctr"/>
-            <a:r>
-              <a:rPr lang="en-US" sz="3200" dirty="0">
-                <a:ln w="0"/>
-                <a:solidFill>
-                  <a:schemeClr val="tx1"/>
-                </a:solidFill>
-                <a:effectLst>
-                  <a:outerShdw blurRad="38100" dist="19050" dir="2700000" algn="tl" rotWithShape="0">
-                    <a:schemeClr val="dk1">
-                      <a:alpha val="40000"/>
-                    </a:schemeClr>
-                  </a:outerShdw>
-                </a:effectLst>
-              </a:rPr>
-              <a:t>Waterproof</a:t>
-            </a:r>
-          </a:p>
-          <a:p>
-            <a:pPr algn="ctr"/>
-            <a:r>
-              <a:rPr lang="en-US" sz="3200" dirty="0">
-                <a:ln w="0"/>
-                <a:solidFill>
-                  <a:schemeClr val="tx1"/>
-                </a:solidFill>
-                <a:effectLst>
-                  <a:outerShdw blurRad="38100" dist="19050" dir="2700000" algn="tl" rotWithShape="0">
-                    <a:schemeClr val="dk1">
-                      <a:alpha val="40000"/>
-                    </a:schemeClr>
-                  </a:outerShdw>
-                </a:effectLst>
-              </a:rPr>
-              <a:t>ABS plastic</a:t>
-            </a:r>
-          </a:p>
-        </p:txBody>
-      </p:sp>
-      <p:sp>
-        <p:nvSpPr>
-          <p:cNvPr id="17" name="Rectangle 16"/>
-          <p:cNvSpPr/>
-          <p:nvPr/>
-        </p:nvSpPr>
-        <p:spPr>
-          <a:xfrm>
-            <a:off x="8221180" y="4284729"/>
-            <a:ext cx="2794833" cy="1077218"/>
-          </a:xfrm>
-          <a:prstGeom prst="rect">
-            <a:avLst/>
-          </a:prstGeom>
-          <a:ln>
-            <a:solidFill>
+            </a:lnRef>
+            <a:fillRef idx="1">
+              <a:schemeClr val="lt1"/>
+            </a:fillRef>
+            <a:effectRef idx="0">
               <a:schemeClr val="accent6"/>
-            </a:solidFill>
-          </a:ln>
-        </p:spPr>
-        <p:style>
-          <a:lnRef idx="2">
-            <a:schemeClr val="accent6"/>
-          </a:lnRef>
-          <a:fillRef idx="1">
-            <a:schemeClr val="lt1"/>
-          </a:fillRef>
-          <a:effectRef idx="0">
-            <a:schemeClr val="accent6"/>
-          </a:effectRef>
-          <a:fontRef idx="minor">
-            <a:schemeClr val="dk1"/>
-          </a:fontRef>
-        </p:style>
-        <p:txBody>
-          <a:bodyPr wrap="square" lIns="91440" tIns="45720" rIns="91440" bIns="45720">
-            <a:spAutoFit/>
-          </a:bodyPr>
-          <a:lstStyle/>
-          <a:p>
-            <a:pPr algn="ctr"/>
-            <a:r>
-              <a:rPr lang="en-US" altLang="zh-CN" sz="3200" dirty="0" smtClean="0">
-                <a:ln w="0"/>
-                <a:solidFill>
-                  <a:schemeClr val="tx1"/>
-                </a:solidFill>
-                <a:effectLst>
-                  <a:outerShdw blurRad="38100" dist="19050" dir="2700000" algn="tl" rotWithShape="0">
-                    <a:schemeClr val="dk1">
-                      <a:alpha val="40000"/>
-                    </a:schemeClr>
-                  </a:outerShdw>
-                </a:effectLst>
-              </a:rPr>
-              <a:t>p</a:t>
-            </a:r>
-            <a:r>
-              <a:rPr lang="en-US" sz="3200" dirty="0" smtClean="0">
-                <a:ln w="0"/>
-                <a:solidFill>
-                  <a:schemeClr val="tx1"/>
-                </a:solidFill>
-                <a:effectLst>
-                  <a:outerShdw blurRad="38100" dist="19050" dir="2700000" algn="tl" rotWithShape="0">
-                    <a:schemeClr val="dk1">
-                      <a:alpha val="40000"/>
-                    </a:schemeClr>
-                  </a:outerShdw>
-                </a:effectLst>
-              </a:rPr>
-              <a:t>H/moisture</a:t>
-            </a:r>
-            <a:r>
-              <a:rPr lang="en-US" sz="3200" dirty="0">
-                <a:ln w="0"/>
-                <a:solidFill>
-                  <a:schemeClr val="tx1"/>
-                </a:solidFill>
-                <a:effectLst>
-                  <a:outerShdw blurRad="38100" dist="19050" dir="2700000" algn="tl" rotWithShape="0">
-                    <a:schemeClr val="dk1">
-                      <a:alpha val="40000"/>
-                    </a:schemeClr>
-                  </a:outerShdw>
-                </a:effectLst>
-              </a:rPr>
-              <a:t>/</a:t>
-            </a:r>
-          </a:p>
-          <a:p>
-            <a:pPr algn="ctr"/>
-            <a:r>
-              <a:rPr lang="en-US" sz="3200" dirty="0" smtClean="0">
-                <a:ln w="0"/>
-                <a:solidFill>
-                  <a:schemeClr val="tx1"/>
-                </a:solidFill>
-                <a:effectLst>
-                  <a:outerShdw blurRad="38100" dist="19050" dir="2700000" algn="tl" rotWithShape="0">
-                    <a:schemeClr val="dk1">
-                      <a:alpha val="40000"/>
-                    </a:schemeClr>
-                  </a:outerShdw>
-                </a:effectLst>
-              </a:rPr>
-              <a:t>element </a:t>
-            </a:r>
-            <a:r>
-              <a:rPr lang="en-US" sz="3200" dirty="0">
-                <a:ln w="0"/>
-                <a:solidFill>
-                  <a:schemeClr val="tx1"/>
-                </a:solidFill>
-                <a:effectLst>
-                  <a:outerShdw blurRad="38100" dist="19050" dir="2700000" algn="tl" rotWithShape="0">
-                    <a:schemeClr val="dk1">
-                      <a:alpha val="40000"/>
-                    </a:schemeClr>
-                  </a:outerShdw>
-                </a:effectLst>
-              </a:rPr>
-              <a:t>sensors</a:t>
-            </a:r>
-          </a:p>
-        </p:txBody>
-      </p:sp>
+            </a:effectRef>
+            <a:fontRef idx="minor">
+              <a:schemeClr val="dk1"/>
+            </a:fontRef>
+          </p:style>
+          <p:txBody>
+            <a:bodyPr wrap="square" lIns="91440" tIns="45720" rIns="91440" bIns="45720">
+              <a:spAutoFit/>
+            </a:bodyPr>
+            <a:lstStyle/>
+            <a:p>
+              <a:pPr algn="ctr"/>
+              <a:r>
+                <a:rPr lang="en-US" altLang="zh-CN" sz="3200" dirty="0" smtClean="0">
+                  <a:ln w="0"/>
+                  <a:solidFill>
+                    <a:schemeClr val="tx1"/>
+                  </a:solidFill>
+                  <a:effectLst>
+                    <a:outerShdw blurRad="38100" dist="19050" dir="2700000" algn="tl" rotWithShape="0">
+                      <a:schemeClr val="dk1">
+                        <a:alpha val="40000"/>
+                      </a:schemeClr>
+                    </a:outerShdw>
+                  </a:effectLst>
+                </a:rPr>
+                <a:t>p</a:t>
+              </a:r>
+              <a:r>
+                <a:rPr lang="en-US" sz="3200" dirty="0" smtClean="0">
+                  <a:ln w="0"/>
+                  <a:solidFill>
+                    <a:schemeClr val="tx1"/>
+                  </a:solidFill>
+                  <a:effectLst>
+                    <a:outerShdw blurRad="38100" dist="19050" dir="2700000" algn="tl" rotWithShape="0">
+                      <a:schemeClr val="dk1">
+                        <a:alpha val="40000"/>
+                      </a:schemeClr>
+                    </a:outerShdw>
+                  </a:effectLst>
+                </a:rPr>
+                <a:t>H/moisture</a:t>
+              </a:r>
+              <a:r>
+                <a:rPr lang="en-US" sz="3200" dirty="0">
+                  <a:ln w="0"/>
+                  <a:solidFill>
+                    <a:schemeClr val="tx1"/>
+                  </a:solidFill>
+                  <a:effectLst>
+                    <a:outerShdw blurRad="38100" dist="19050" dir="2700000" algn="tl" rotWithShape="0">
+                      <a:schemeClr val="dk1">
+                        <a:alpha val="40000"/>
+                      </a:schemeClr>
+                    </a:outerShdw>
+                  </a:effectLst>
+                </a:rPr>
+                <a:t>/</a:t>
+              </a:r>
+            </a:p>
+            <a:p>
+              <a:pPr algn="ctr"/>
+              <a:r>
+                <a:rPr lang="en-US" sz="3200" dirty="0" smtClean="0">
+                  <a:ln w="0"/>
+                  <a:solidFill>
+                    <a:schemeClr val="tx1"/>
+                  </a:solidFill>
+                  <a:effectLst>
+                    <a:outerShdw blurRad="38100" dist="19050" dir="2700000" algn="tl" rotWithShape="0">
+                      <a:schemeClr val="dk1">
+                        <a:alpha val="40000"/>
+                      </a:schemeClr>
+                    </a:outerShdw>
+                  </a:effectLst>
+                </a:rPr>
+                <a:t>element </a:t>
+              </a:r>
+              <a:r>
+                <a:rPr lang="en-US" sz="3200" dirty="0">
+                  <a:ln w="0"/>
+                  <a:solidFill>
+                    <a:schemeClr val="tx1"/>
+                  </a:solidFill>
+                  <a:effectLst>
+                    <a:outerShdw blurRad="38100" dist="19050" dir="2700000" algn="tl" rotWithShape="0">
+                      <a:schemeClr val="dk1">
+                        <a:alpha val="40000"/>
+                      </a:schemeClr>
+                    </a:outerShdw>
+                  </a:effectLst>
+                </a:rPr>
+                <a:t>sensors</a:t>
+              </a:r>
+            </a:p>
+          </p:txBody>
+        </p:sp>
+      </p:grpSp>
     </p:spTree>
     <p:extLst>
       <p:ext uri="{BB962C8B-B14F-4D97-AF65-F5344CB8AC3E}">
@@ -10430,6 +11696,171 @@
   <p:clrMapOvr>
     <a:masterClrMapping/>
   </p:clrMapOvr>
+  <p:timing>
+    <p:tnLst>
+      <p:par>
+        <p:cTn id="1" dur="indefinite" restart="never" nodeType="tmRoot">
+          <p:childTnLst>
+            <p:seq concurrent="1" nextAc="seek">
+              <p:cTn id="2" dur="indefinite" nodeType="mainSeq">
+                <p:childTnLst>
+                  <p:par>
+                    <p:cTn id="3" fill="hold">
+                      <p:stCondLst>
+                        <p:cond delay="indefinite"/>
+                      </p:stCondLst>
+                      <p:childTnLst>
+                        <p:par>
+                          <p:cTn id="4" fill="hold">
+                            <p:stCondLst>
+                              <p:cond delay="0"/>
+                            </p:stCondLst>
+                            <p:childTnLst>
+                              <p:par>
+                                <p:cTn id="5" presetID="1" presetClass="entr" presetSubtype="0" fill="hold" nodeType="clickEffect">
+                                  <p:stCondLst>
+                                    <p:cond delay="0"/>
+                                  </p:stCondLst>
+                                  <p:childTnLst>
+                                    <p:set>
+                                      <p:cBhvr>
+                                        <p:cTn id="6" dur="1" fill="hold">
+                                          <p:stCondLst>
+                                            <p:cond delay="0"/>
+                                          </p:stCondLst>
+                                        </p:cTn>
+                                        <p:tgtEl>
+                                          <p:spTgt spid="3"/>
+                                        </p:tgtEl>
+                                        <p:attrNameLst>
+                                          <p:attrName>style.visibility</p:attrName>
+                                        </p:attrNameLst>
+                                      </p:cBhvr>
+                                      <p:to>
+                                        <p:strVal val="visible"/>
+                                      </p:to>
+                                    </p:set>
+                                  </p:childTnLst>
+                                </p:cTn>
+                              </p:par>
+                            </p:childTnLst>
+                          </p:cTn>
+                        </p:par>
+                      </p:childTnLst>
+                    </p:cTn>
+                  </p:par>
+                  <p:par>
+                    <p:cTn id="7" fill="hold">
+                      <p:stCondLst>
+                        <p:cond delay="indefinite"/>
+                      </p:stCondLst>
+                      <p:childTnLst>
+                        <p:par>
+                          <p:cTn id="8" fill="hold">
+                            <p:stCondLst>
+                              <p:cond delay="0"/>
+                            </p:stCondLst>
+                            <p:childTnLst>
+                              <p:par>
+                                <p:cTn id="9" presetID="1" presetClass="entr" presetSubtype="0" fill="hold" nodeType="clickEffect">
+                                  <p:stCondLst>
+                                    <p:cond delay="0"/>
+                                  </p:stCondLst>
+                                  <p:childTnLst>
+                                    <p:set>
+                                      <p:cBhvr>
+                                        <p:cTn id="10" dur="1" fill="hold">
+                                          <p:stCondLst>
+                                            <p:cond delay="0"/>
+                                          </p:stCondLst>
+                                        </p:cTn>
+                                        <p:tgtEl>
+                                          <p:spTgt spid="5"/>
+                                        </p:tgtEl>
+                                        <p:attrNameLst>
+                                          <p:attrName>style.visibility</p:attrName>
+                                        </p:attrNameLst>
+                                      </p:cBhvr>
+                                      <p:to>
+                                        <p:strVal val="visible"/>
+                                      </p:to>
+                                    </p:set>
+                                  </p:childTnLst>
+                                </p:cTn>
+                              </p:par>
+                            </p:childTnLst>
+                          </p:cTn>
+                        </p:par>
+                      </p:childTnLst>
+                    </p:cTn>
+                  </p:par>
+                  <p:par>
+                    <p:cTn id="11" fill="hold">
+                      <p:stCondLst>
+                        <p:cond delay="indefinite"/>
+                      </p:stCondLst>
+                      <p:childTnLst>
+                        <p:par>
+                          <p:cTn id="12" fill="hold">
+                            <p:stCondLst>
+                              <p:cond delay="0"/>
+                            </p:stCondLst>
+                            <p:childTnLst>
+                              <p:par>
+                                <p:cTn id="13" presetID="1" presetClass="entr" presetSubtype="0" fill="hold" nodeType="clickEffect">
+                                  <p:stCondLst>
+                                    <p:cond delay="0"/>
+                                  </p:stCondLst>
+                                  <p:childTnLst>
+                                    <p:set>
+                                      <p:cBhvr>
+                                        <p:cTn id="14" dur="1" fill="hold">
+                                          <p:stCondLst>
+                                            <p:cond delay="0"/>
+                                          </p:stCondLst>
+                                        </p:cTn>
+                                        <p:tgtEl>
+                                          <p:spTgt spid="6"/>
+                                        </p:tgtEl>
+                                        <p:attrNameLst>
+                                          <p:attrName>style.visibility</p:attrName>
+                                        </p:attrNameLst>
+                                      </p:cBhvr>
+                                      <p:to>
+                                        <p:strVal val="visible"/>
+                                      </p:to>
+                                    </p:set>
+                                  </p:childTnLst>
+                                </p:cTn>
+                              </p:par>
+                            </p:childTnLst>
+                          </p:cTn>
+                        </p:par>
+                      </p:childTnLst>
+                    </p:cTn>
+                  </p:par>
+                </p:childTnLst>
+              </p:cTn>
+              <p:prevCondLst>
+                <p:cond evt="onPrev" delay="0">
+                  <p:tgtEl>
+                    <p:sldTgt/>
+                  </p:tgtEl>
+                </p:cond>
+              </p:prevCondLst>
+              <p:nextCondLst>
+                <p:cond evt="onNext" delay="0">
+                  <p:tgtEl>
+                    <p:sldTgt/>
+                  </p:tgtEl>
+                </p:cond>
+              </p:nextCondLst>
+            </p:seq>
+          </p:childTnLst>
+        </p:cTn>
+      </p:par>
+    </p:tnLst>
+  </p:timing>
 </p:sld>
 </file>
 
@@ -10503,7 +11934,7 @@
         </p:xfrm>
         <a:graphic>
           <a:graphicData uri="http://schemas.openxmlformats.org/drawingml/2006/diagram">
-            <dgm:relIds xmlns:dgm="http://schemas.openxmlformats.org/drawingml/2006/diagram" xmlns:r="http://schemas.openxmlformats.org/officeDocument/2006/relationships" r:dm="rId2" r:lo="rId3" r:qs="rId4" r:cs="rId5"/>
+            <dgm:relIds xmlns:dgm="http://schemas.openxmlformats.org/drawingml/2006/diagram" xmlns:r="http://schemas.openxmlformats.org/officeDocument/2006/relationships" r:dm="rId3" r:lo="rId4" r:qs="rId5" r:cs="rId6"/>
           </a:graphicData>
         </a:graphic>
       </p:graphicFrame>
@@ -10517,6 +11948,13 @@
   <p:clrMapOvr>
     <a:masterClrMapping/>
   </p:clrMapOvr>
+  <p:timing>
+    <p:tnLst>
+      <p:par>
+        <p:cTn id="1" dur="indefinite" restart="never" nodeType="tmRoot"/>
+      </p:par>
+    </p:tnLst>
+  </p:timing>
 </p:sld>
 </file>
 
@@ -10554,11 +11992,7 @@
           <a:p>
             <a:r>
               <a:rPr lang="en-US" dirty="0" smtClean="0"/>
-              <a:t>Key </a:t>
-            </a:r>
-            <a:r>
-              <a:rPr lang="en-US" dirty="0" smtClean="0"/>
-              <a:t>Enabler</a:t>
+              <a:t>Key Enabler</a:t>
             </a:r>
             <a:endParaRPr lang="en-US" dirty="0"/>
           </a:p>
@@ -10636,6 +12070,284 @@
   <p:clrMapOvr>
     <a:masterClrMapping/>
   </p:clrMapOvr>
+  <p:timing>
+    <p:tnLst>
+      <p:par>
+        <p:cTn id="1" dur="indefinite" restart="never" nodeType="tmRoot">
+          <p:childTnLst>
+            <p:seq concurrent="1" nextAc="seek">
+              <p:cTn id="2" dur="indefinite" nodeType="mainSeq">
+                <p:childTnLst>
+                  <p:par>
+                    <p:cTn id="3" fill="hold">
+                      <p:stCondLst>
+                        <p:cond delay="indefinite"/>
+                      </p:stCondLst>
+                      <p:childTnLst>
+                        <p:par>
+                          <p:cTn id="4" fill="hold">
+                            <p:stCondLst>
+                              <p:cond delay="0"/>
+                            </p:stCondLst>
+                            <p:childTnLst>
+                              <p:par>
+                                <p:cTn id="5" presetID="1" presetClass="entr" presetSubtype="0" fill="hold" grpId="0" nodeType="clickEffect">
+                                  <p:stCondLst>
+                                    <p:cond delay="0"/>
+                                  </p:stCondLst>
+                                  <p:childTnLst>
+                                    <p:set>
+                                      <p:cBhvr>
+                                        <p:cTn id="6" dur="1" fill="hold">
+                                          <p:stCondLst>
+                                            <p:cond delay="0"/>
+                                          </p:stCondLst>
+                                        </p:cTn>
+                                        <p:tgtEl>
+                                          <p:spTgt spid="3">
+                                            <p:txEl>
+                                              <p:pRg st="0" end="0"/>
+                                            </p:txEl>
+                                          </p:spTgt>
+                                        </p:tgtEl>
+                                        <p:attrNameLst>
+                                          <p:attrName>style.visibility</p:attrName>
+                                        </p:attrNameLst>
+                                      </p:cBhvr>
+                                      <p:to>
+                                        <p:strVal val="visible"/>
+                                      </p:to>
+                                    </p:set>
+                                  </p:childTnLst>
+                                </p:cTn>
+                              </p:par>
+                            </p:childTnLst>
+                          </p:cTn>
+                        </p:par>
+                      </p:childTnLst>
+                    </p:cTn>
+                  </p:par>
+                  <p:par>
+                    <p:cTn id="7" fill="hold">
+                      <p:stCondLst>
+                        <p:cond delay="indefinite"/>
+                      </p:stCondLst>
+                      <p:childTnLst>
+                        <p:par>
+                          <p:cTn id="8" fill="hold">
+                            <p:stCondLst>
+                              <p:cond delay="0"/>
+                            </p:stCondLst>
+                            <p:childTnLst>
+                              <p:par>
+                                <p:cTn id="9" presetID="1" presetClass="entr" presetSubtype="0" fill="hold" grpId="0" nodeType="clickEffect">
+                                  <p:stCondLst>
+                                    <p:cond delay="0"/>
+                                  </p:stCondLst>
+                                  <p:childTnLst>
+                                    <p:set>
+                                      <p:cBhvr>
+                                        <p:cTn id="10" dur="1" fill="hold">
+                                          <p:stCondLst>
+                                            <p:cond delay="0"/>
+                                          </p:stCondLst>
+                                        </p:cTn>
+                                        <p:tgtEl>
+                                          <p:spTgt spid="3">
+                                            <p:txEl>
+                                              <p:pRg st="1" end="1"/>
+                                            </p:txEl>
+                                          </p:spTgt>
+                                        </p:tgtEl>
+                                        <p:attrNameLst>
+                                          <p:attrName>style.visibility</p:attrName>
+                                        </p:attrNameLst>
+                                      </p:cBhvr>
+                                      <p:to>
+                                        <p:strVal val="visible"/>
+                                      </p:to>
+                                    </p:set>
+                                  </p:childTnLst>
+                                </p:cTn>
+                              </p:par>
+                            </p:childTnLst>
+                          </p:cTn>
+                        </p:par>
+                      </p:childTnLst>
+                    </p:cTn>
+                  </p:par>
+                  <p:par>
+                    <p:cTn id="11" fill="hold">
+                      <p:stCondLst>
+                        <p:cond delay="indefinite"/>
+                      </p:stCondLst>
+                      <p:childTnLst>
+                        <p:par>
+                          <p:cTn id="12" fill="hold">
+                            <p:stCondLst>
+                              <p:cond delay="0"/>
+                            </p:stCondLst>
+                            <p:childTnLst>
+                              <p:par>
+                                <p:cTn id="13" presetID="1" presetClass="entr" presetSubtype="0" fill="hold" grpId="0" nodeType="clickEffect">
+                                  <p:stCondLst>
+                                    <p:cond delay="0"/>
+                                  </p:stCondLst>
+                                  <p:childTnLst>
+                                    <p:set>
+                                      <p:cBhvr>
+                                        <p:cTn id="14" dur="1" fill="hold">
+                                          <p:stCondLst>
+                                            <p:cond delay="0"/>
+                                          </p:stCondLst>
+                                        </p:cTn>
+                                        <p:tgtEl>
+                                          <p:spTgt spid="3">
+                                            <p:txEl>
+                                              <p:pRg st="2" end="2"/>
+                                            </p:txEl>
+                                          </p:spTgt>
+                                        </p:tgtEl>
+                                        <p:attrNameLst>
+                                          <p:attrName>style.visibility</p:attrName>
+                                        </p:attrNameLst>
+                                      </p:cBhvr>
+                                      <p:to>
+                                        <p:strVal val="visible"/>
+                                      </p:to>
+                                    </p:set>
+                                  </p:childTnLst>
+                                </p:cTn>
+                              </p:par>
+                            </p:childTnLst>
+                          </p:cTn>
+                        </p:par>
+                      </p:childTnLst>
+                    </p:cTn>
+                  </p:par>
+                  <p:par>
+                    <p:cTn id="15" fill="hold">
+                      <p:stCondLst>
+                        <p:cond delay="indefinite"/>
+                      </p:stCondLst>
+                      <p:childTnLst>
+                        <p:par>
+                          <p:cTn id="16" fill="hold">
+                            <p:stCondLst>
+                              <p:cond delay="0"/>
+                            </p:stCondLst>
+                            <p:childTnLst>
+                              <p:par>
+                                <p:cTn id="17" presetID="1" presetClass="entr" presetSubtype="0" fill="hold" grpId="0" nodeType="clickEffect">
+                                  <p:stCondLst>
+                                    <p:cond delay="0"/>
+                                  </p:stCondLst>
+                                  <p:childTnLst>
+                                    <p:set>
+                                      <p:cBhvr>
+                                        <p:cTn id="18" dur="1" fill="hold">
+                                          <p:stCondLst>
+                                            <p:cond delay="0"/>
+                                          </p:stCondLst>
+                                        </p:cTn>
+                                        <p:tgtEl>
+                                          <p:spTgt spid="3">
+                                            <p:txEl>
+                                              <p:pRg st="3" end="3"/>
+                                            </p:txEl>
+                                          </p:spTgt>
+                                        </p:tgtEl>
+                                        <p:attrNameLst>
+                                          <p:attrName>style.visibility</p:attrName>
+                                        </p:attrNameLst>
+                                      </p:cBhvr>
+                                      <p:to>
+                                        <p:strVal val="visible"/>
+                                      </p:to>
+                                    </p:set>
+                                  </p:childTnLst>
+                                </p:cTn>
+                              </p:par>
+                            </p:childTnLst>
+                          </p:cTn>
+                        </p:par>
+                      </p:childTnLst>
+                    </p:cTn>
+                  </p:par>
+                  <p:par>
+                    <p:cTn id="19" fill="hold">
+                      <p:stCondLst>
+                        <p:cond delay="indefinite"/>
+                      </p:stCondLst>
+                      <p:childTnLst>
+                        <p:par>
+                          <p:cTn id="20" fill="hold">
+                            <p:stCondLst>
+                              <p:cond delay="0"/>
+                            </p:stCondLst>
+                            <p:childTnLst>
+                              <p:par>
+                                <p:cTn id="21" presetID="1" presetClass="entr" presetSubtype="0" fill="hold" grpId="0" nodeType="clickEffect">
+                                  <p:stCondLst>
+                                    <p:cond delay="0"/>
+                                  </p:stCondLst>
+                                  <p:childTnLst>
+                                    <p:set>
+                                      <p:cBhvr>
+                                        <p:cTn id="22" dur="1" fill="hold">
+                                          <p:stCondLst>
+                                            <p:cond delay="0"/>
+                                          </p:stCondLst>
+                                        </p:cTn>
+                                        <p:tgtEl>
+                                          <p:spTgt spid="3">
+                                            <p:txEl>
+                                              <p:pRg st="4" end="4"/>
+                                            </p:txEl>
+                                          </p:spTgt>
+                                        </p:tgtEl>
+                                        <p:attrNameLst>
+                                          <p:attrName>style.visibility</p:attrName>
+                                        </p:attrNameLst>
+                                      </p:cBhvr>
+                                      <p:to>
+                                        <p:strVal val="visible"/>
+                                      </p:to>
+                                    </p:set>
+                                  </p:childTnLst>
+                                </p:cTn>
+                              </p:par>
+                            </p:childTnLst>
+                          </p:cTn>
+                        </p:par>
+                      </p:childTnLst>
+                    </p:cTn>
+                  </p:par>
+                </p:childTnLst>
+              </p:cTn>
+              <p:prevCondLst>
+                <p:cond evt="onPrev" delay="0">
+                  <p:tgtEl>
+                    <p:sldTgt/>
+                  </p:tgtEl>
+                </p:cond>
+              </p:prevCondLst>
+              <p:nextCondLst>
+                <p:cond evt="onNext" delay="0">
+                  <p:tgtEl>
+                    <p:sldTgt/>
+                  </p:tgtEl>
+                </p:cond>
+              </p:nextCondLst>
+            </p:seq>
+          </p:childTnLst>
+        </p:cTn>
+      </p:par>
+    </p:tnLst>
+    <p:bldLst>
+      <p:bldP spid="3" grpId="0" build="p"/>
+    </p:bldLst>
+  </p:timing>
 </p:sld>
 </file>
 
@@ -10673,11 +12385,7 @@
           <a:p>
             <a:r>
               <a:rPr lang="en-US" dirty="0" smtClean="0"/>
-              <a:t>Key </a:t>
-            </a:r>
-            <a:r>
-              <a:rPr lang="en-US" dirty="0" smtClean="0"/>
-              <a:t>Barrier </a:t>
+              <a:t>Key Barrier </a:t>
             </a:r>
             <a:endParaRPr lang="en-US" dirty="0"/>
           </a:p>
@@ -10716,8 +12424,13 @@
           <a:p>
             <a:r>
               <a:rPr lang="en-US" dirty="0" smtClean="0"/>
-              <a:t>Components must be power-saver</a:t>
+              <a:t>Components must be </a:t>
             </a:r>
+            <a:r>
+              <a:rPr lang="en-US" dirty="0" smtClean="0"/>
+              <a:t>power-saving</a:t>
+            </a:r>
+            <a:endParaRPr lang="en-US" dirty="0" smtClean="0"/>
           </a:p>
           <a:p>
             <a:endParaRPr lang="en-US" dirty="0"/>
@@ -10734,6 +12447,186 @@
   <p:clrMapOvr>
     <a:masterClrMapping/>
   </p:clrMapOvr>
+  <p:timing>
+    <p:tnLst>
+      <p:par>
+        <p:cTn id="1" dur="indefinite" restart="never" nodeType="tmRoot">
+          <p:childTnLst>
+            <p:seq concurrent="1" nextAc="seek">
+              <p:cTn id="2" dur="indefinite" nodeType="mainSeq">
+                <p:childTnLst>
+                  <p:par>
+                    <p:cTn id="3" fill="hold">
+                      <p:stCondLst>
+                        <p:cond delay="indefinite"/>
+                      </p:stCondLst>
+                      <p:childTnLst>
+                        <p:par>
+                          <p:cTn id="4" fill="hold">
+                            <p:stCondLst>
+                              <p:cond delay="0"/>
+                            </p:stCondLst>
+                            <p:childTnLst>
+                              <p:par>
+                                <p:cTn id="5" presetID="1" presetClass="entr" presetSubtype="0" fill="hold" grpId="0" nodeType="clickEffect">
+                                  <p:stCondLst>
+                                    <p:cond delay="0"/>
+                                  </p:stCondLst>
+                                  <p:childTnLst>
+                                    <p:set>
+                                      <p:cBhvr>
+                                        <p:cTn id="6" dur="1" fill="hold">
+                                          <p:stCondLst>
+                                            <p:cond delay="0"/>
+                                          </p:stCondLst>
+                                        </p:cTn>
+                                        <p:tgtEl>
+                                          <p:spTgt spid="3">
+                                            <p:txEl>
+                                              <p:pRg st="0" end="0"/>
+                                            </p:txEl>
+                                          </p:spTgt>
+                                        </p:tgtEl>
+                                        <p:attrNameLst>
+                                          <p:attrName>style.visibility</p:attrName>
+                                        </p:attrNameLst>
+                                      </p:cBhvr>
+                                      <p:to>
+                                        <p:strVal val="visible"/>
+                                      </p:to>
+                                    </p:set>
+                                  </p:childTnLst>
+                                </p:cTn>
+                              </p:par>
+                            </p:childTnLst>
+                          </p:cTn>
+                        </p:par>
+                      </p:childTnLst>
+                    </p:cTn>
+                  </p:par>
+                  <p:par>
+                    <p:cTn id="7" fill="hold">
+                      <p:stCondLst>
+                        <p:cond delay="indefinite"/>
+                      </p:stCondLst>
+                      <p:childTnLst>
+                        <p:par>
+                          <p:cTn id="8" fill="hold">
+                            <p:stCondLst>
+                              <p:cond delay="0"/>
+                            </p:stCondLst>
+                            <p:childTnLst>
+                              <p:par>
+                                <p:cTn id="9" presetID="1" presetClass="entr" presetSubtype="0" fill="hold" grpId="0" nodeType="clickEffect">
+                                  <p:stCondLst>
+                                    <p:cond delay="0"/>
+                                  </p:stCondLst>
+                                  <p:childTnLst>
+                                    <p:set>
+                                      <p:cBhvr>
+                                        <p:cTn id="10" dur="1" fill="hold">
+                                          <p:stCondLst>
+                                            <p:cond delay="0"/>
+                                          </p:stCondLst>
+                                        </p:cTn>
+                                        <p:tgtEl>
+                                          <p:spTgt spid="3">
+                                            <p:txEl>
+                                              <p:pRg st="1" end="1"/>
+                                            </p:txEl>
+                                          </p:spTgt>
+                                        </p:tgtEl>
+                                        <p:attrNameLst>
+                                          <p:attrName>style.visibility</p:attrName>
+                                        </p:attrNameLst>
+                                      </p:cBhvr>
+                                      <p:to>
+                                        <p:strVal val="visible"/>
+                                      </p:to>
+                                    </p:set>
+                                  </p:childTnLst>
+                                </p:cTn>
+                              </p:par>
+                            </p:childTnLst>
+                          </p:cTn>
+                        </p:par>
+                      </p:childTnLst>
+                    </p:cTn>
+                  </p:par>
+                  <p:par>
+                    <p:cTn id="11" fill="hold">
+                      <p:stCondLst>
+                        <p:cond delay="indefinite"/>
+                      </p:stCondLst>
+                      <p:childTnLst>
+                        <p:par>
+                          <p:cTn id="12" fill="hold">
+                            <p:stCondLst>
+                              <p:cond delay="0"/>
+                            </p:stCondLst>
+                            <p:childTnLst>
+                              <p:par>
+                                <p:cTn id="13" presetID="1" presetClass="entr" presetSubtype="0" fill="hold" grpId="0" nodeType="clickEffect">
+                                  <p:stCondLst>
+                                    <p:cond delay="0"/>
+                                  </p:stCondLst>
+                                  <p:childTnLst>
+                                    <p:set>
+                                      <p:cBhvr>
+                                        <p:cTn id="14" dur="1" fill="hold">
+                                          <p:stCondLst>
+                                            <p:cond delay="0"/>
+                                          </p:stCondLst>
+                                        </p:cTn>
+                                        <p:tgtEl>
+                                          <p:spTgt spid="3">
+                                            <p:txEl>
+                                              <p:pRg st="2" end="2"/>
+                                            </p:txEl>
+                                          </p:spTgt>
+                                        </p:tgtEl>
+                                        <p:attrNameLst>
+                                          <p:attrName>style.visibility</p:attrName>
+                                        </p:attrNameLst>
+                                      </p:cBhvr>
+                                      <p:to>
+                                        <p:strVal val="visible"/>
+                                      </p:to>
+                                    </p:set>
+                                  </p:childTnLst>
+                                </p:cTn>
+                              </p:par>
+                            </p:childTnLst>
+                          </p:cTn>
+                        </p:par>
+                      </p:childTnLst>
+                    </p:cTn>
+                  </p:par>
+                </p:childTnLst>
+              </p:cTn>
+              <p:prevCondLst>
+                <p:cond evt="onPrev" delay="0">
+                  <p:tgtEl>
+                    <p:sldTgt/>
+                  </p:tgtEl>
+                </p:cond>
+              </p:prevCondLst>
+              <p:nextCondLst>
+                <p:cond evt="onNext" delay="0">
+                  <p:tgtEl>
+                    <p:sldTgt/>
+                  </p:tgtEl>
+                </p:cond>
+              </p:nextCondLst>
+            </p:seq>
+          </p:childTnLst>
+        </p:cTn>
+      </p:par>
+    </p:tnLst>
+    <p:bldLst>
+      <p:bldP spid="3" grpId="0" build="p"/>
+    </p:bldLst>
+  </p:timing>
 </p:sld>
 </file>
 
@@ -10841,6 +12734,235 @@
   <p:clrMapOvr>
     <a:masterClrMapping/>
   </p:clrMapOvr>
+  <p:timing>
+    <p:tnLst>
+      <p:par>
+        <p:cTn id="1" dur="indefinite" restart="never" nodeType="tmRoot">
+          <p:childTnLst>
+            <p:seq concurrent="1" nextAc="seek">
+              <p:cTn id="2" dur="indefinite" nodeType="mainSeq">
+                <p:childTnLst>
+                  <p:par>
+                    <p:cTn id="3" fill="hold">
+                      <p:stCondLst>
+                        <p:cond delay="indefinite"/>
+                      </p:stCondLst>
+                      <p:childTnLst>
+                        <p:par>
+                          <p:cTn id="4" fill="hold">
+                            <p:stCondLst>
+                              <p:cond delay="0"/>
+                            </p:stCondLst>
+                            <p:childTnLst>
+                              <p:par>
+                                <p:cTn id="5" presetID="1" presetClass="entr" presetSubtype="0" fill="hold" grpId="0" nodeType="clickEffect">
+                                  <p:stCondLst>
+                                    <p:cond delay="0"/>
+                                  </p:stCondLst>
+                                  <p:childTnLst>
+                                    <p:set>
+                                      <p:cBhvr>
+                                        <p:cTn id="6" dur="1" fill="hold">
+                                          <p:stCondLst>
+                                            <p:cond delay="0"/>
+                                          </p:stCondLst>
+                                        </p:cTn>
+                                        <p:tgtEl>
+                                          <p:spTgt spid="3">
+                                            <p:txEl>
+                                              <p:pRg st="0" end="0"/>
+                                            </p:txEl>
+                                          </p:spTgt>
+                                        </p:tgtEl>
+                                        <p:attrNameLst>
+                                          <p:attrName>style.visibility</p:attrName>
+                                        </p:attrNameLst>
+                                      </p:cBhvr>
+                                      <p:to>
+                                        <p:strVal val="visible"/>
+                                      </p:to>
+                                    </p:set>
+                                  </p:childTnLst>
+                                </p:cTn>
+                              </p:par>
+                            </p:childTnLst>
+                          </p:cTn>
+                        </p:par>
+                      </p:childTnLst>
+                    </p:cTn>
+                  </p:par>
+                  <p:par>
+                    <p:cTn id="7" fill="hold">
+                      <p:stCondLst>
+                        <p:cond delay="indefinite"/>
+                      </p:stCondLst>
+                      <p:childTnLst>
+                        <p:par>
+                          <p:cTn id="8" fill="hold">
+                            <p:stCondLst>
+                              <p:cond delay="0"/>
+                            </p:stCondLst>
+                            <p:childTnLst>
+                              <p:par>
+                                <p:cTn id="9" presetID="1" presetClass="entr" presetSubtype="0" fill="hold" grpId="0" nodeType="clickEffect">
+                                  <p:stCondLst>
+                                    <p:cond delay="0"/>
+                                  </p:stCondLst>
+                                  <p:childTnLst>
+                                    <p:set>
+                                      <p:cBhvr>
+                                        <p:cTn id="10" dur="1" fill="hold">
+                                          <p:stCondLst>
+                                            <p:cond delay="0"/>
+                                          </p:stCondLst>
+                                        </p:cTn>
+                                        <p:tgtEl>
+                                          <p:spTgt spid="3">
+                                            <p:txEl>
+                                              <p:pRg st="1" end="1"/>
+                                            </p:txEl>
+                                          </p:spTgt>
+                                        </p:tgtEl>
+                                        <p:attrNameLst>
+                                          <p:attrName>style.visibility</p:attrName>
+                                        </p:attrNameLst>
+                                      </p:cBhvr>
+                                      <p:to>
+                                        <p:strVal val="visible"/>
+                                      </p:to>
+                                    </p:set>
+                                  </p:childTnLst>
+                                </p:cTn>
+                              </p:par>
+                            </p:childTnLst>
+                          </p:cTn>
+                        </p:par>
+                      </p:childTnLst>
+                    </p:cTn>
+                  </p:par>
+                  <p:par>
+                    <p:cTn id="11" fill="hold">
+                      <p:stCondLst>
+                        <p:cond delay="indefinite"/>
+                      </p:stCondLst>
+                      <p:childTnLst>
+                        <p:par>
+                          <p:cTn id="12" fill="hold">
+                            <p:stCondLst>
+                              <p:cond delay="0"/>
+                            </p:stCondLst>
+                            <p:childTnLst>
+                              <p:par>
+                                <p:cTn id="13" presetID="1" presetClass="entr" presetSubtype="0" fill="hold" grpId="0" nodeType="clickEffect">
+                                  <p:stCondLst>
+                                    <p:cond delay="0"/>
+                                  </p:stCondLst>
+                                  <p:childTnLst>
+                                    <p:set>
+                                      <p:cBhvr>
+                                        <p:cTn id="14" dur="1" fill="hold">
+                                          <p:stCondLst>
+                                            <p:cond delay="0"/>
+                                          </p:stCondLst>
+                                        </p:cTn>
+                                        <p:tgtEl>
+                                          <p:spTgt spid="3">
+                                            <p:txEl>
+                                              <p:pRg st="2" end="2"/>
+                                            </p:txEl>
+                                          </p:spTgt>
+                                        </p:tgtEl>
+                                        <p:attrNameLst>
+                                          <p:attrName>style.visibility</p:attrName>
+                                        </p:attrNameLst>
+                                      </p:cBhvr>
+                                      <p:to>
+                                        <p:strVal val="visible"/>
+                                      </p:to>
+                                    </p:set>
+                                  </p:childTnLst>
+                                </p:cTn>
+                              </p:par>
+                            </p:childTnLst>
+                          </p:cTn>
+                        </p:par>
+                      </p:childTnLst>
+                    </p:cTn>
+                  </p:par>
+                  <p:par>
+                    <p:cTn id="15" fill="hold">
+                      <p:stCondLst>
+                        <p:cond delay="indefinite"/>
+                      </p:stCondLst>
+                      <p:childTnLst>
+                        <p:par>
+                          <p:cTn id="16" fill="hold">
+                            <p:stCondLst>
+                              <p:cond delay="0"/>
+                            </p:stCondLst>
+                            <p:childTnLst>
+                              <p:par>
+                                <p:cTn id="17" presetID="1" presetClass="entr" presetSubtype="0" fill="hold" grpId="0" nodeType="clickEffect">
+                                  <p:stCondLst>
+                                    <p:cond delay="0"/>
+                                  </p:stCondLst>
+                                  <p:childTnLst>
+                                    <p:set>
+                                      <p:cBhvr>
+                                        <p:cTn id="18" dur="1" fill="hold">
+                                          <p:stCondLst>
+                                            <p:cond delay="0"/>
+                                          </p:stCondLst>
+                                        </p:cTn>
+                                        <p:tgtEl>
+                                          <p:spTgt spid="3">
+                                            <p:txEl>
+                                              <p:pRg st="3" end="3"/>
+                                            </p:txEl>
+                                          </p:spTgt>
+                                        </p:tgtEl>
+                                        <p:attrNameLst>
+                                          <p:attrName>style.visibility</p:attrName>
+                                        </p:attrNameLst>
+                                      </p:cBhvr>
+                                      <p:to>
+                                        <p:strVal val="visible"/>
+                                      </p:to>
+                                    </p:set>
+                                  </p:childTnLst>
+                                </p:cTn>
+                              </p:par>
+                            </p:childTnLst>
+                          </p:cTn>
+                        </p:par>
+                      </p:childTnLst>
+                    </p:cTn>
+                  </p:par>
+                </p:childTnLst>
+              </p:cTn>
+              <p:prevCondLst>
+                <p:cond evt="onPrev" delay="0">
+                  <p:tgtEl>
+                    <p:sldTgt/>
+                  </p:tgtEl>
+                </p:cond>
+              </p:prevCondLst>
+              <p:nextCondLst>
+                <p:cond evt="onNext" delay="0">
+                  <p:tgtEl>
+                    <p:sldTgt/>
+                  </p:tgtEl>
+                </p:cond>
+              </p:nextCondLst>
+            </p:seq>
+          </p:childTnLst>
+        </p:cTn>
+      </p:par>
+    </p:tnLst>
+    <p:bldLst>
+      <p:bldP spid="3" grpId="0" build="p"/>
+    </p:bldLst>
+  </p:timing>
 </p:sld>
 </file>
 
@@ -11075,4 +13197,265 @@
     </a:ext>
   </a:extLst>
 </a:theme>
+</file>
+
+<file path=ppt/theme/theme2.xml><?xml version="1.0" encoding="utf-8"?>
+<a:theme xmlns:a="http://schemas.openxmlformats.org/drawingml/2006/main" name="Office Theme">
+  <a:themeElements>
+    <a:clrScheme name="Office">
+      <a:dk1>
+        <a:sysClr val="windowText" lastClr="000000"/>
+      </a:dk1>
+      <a:lt1>
+        <a:sysClr val="window" lastClr="FFFFFF"/>
+      </a:lt1>
+      <a:dk2>
+        <a:srgbClr val="44546A"/>
+      </a:dk2>
+      <a:lt2>
+        <a:srgbClr val="E7E6E6"/>
+      </a:lt2>
+      <a:accent1>
+        <a:srgbClr val="5B9BD5"/>
+      </a:accent1>
+      <a:accent2>
+        <a:srgbClr val="ED7D31"/>
+      </a:accent2>
+      <a:accent3>
+        <a:srgbClr val="A5A5A5"/>
+      </a:accent3>
+      <a:accent4>
+        <a:srgbClr val="FFC000"/>
+      </a:accent4>
+      <a:accent5>
+        <a:srgbClr val="4472C4"/>
+      </a:accent5>
+      <a:accent6>
+        <a:srgbClr val="70AD47"/>
+      </a:accent6>
+      <a:hlink>
+        <a:srgbClr val="0563C1"/>
+      </a:hlink>
+      <a:folHlink>
+        <a:srgbClr val="954F72"/>
+      </a:folHlink>
+    </a:clrScheme>
+    <a:fontScheme name="Office">
+      <a:majorFont>
+        <a:latin typeface="Calibri Light" panose="020F0302020204030204"/>
+        <a:ea typeface=""/>
+        <a:cs typeface=""/>
+        <a:font script="Jpan" typeface="Yu Gothic Light"/>
+        <a:font script="Hang" typeface="맑은 고딕"/>
+        <a:font script="Hans" typeface="DengXian Light"/>
+        <a:font script="Hant" typeface="新細明體"/>
+        <a:font script="Arab" typeface="Times New Roman"/>
+        <a:font script="Hebr" typeface="Times New Roman"/>
+        <a:font script="Thai" typeface="Angsana New"/>
+        <a:font script="Ethi" typeface="Nyala"/>
+        <a:font script="Beng" typeface="Vrinda"/>
+        <a:font script="Gujr" typeface="Shruti"/>
+        <a:font script="Khmr" typeface="MoolBoran"/>
+        <a:font script="Knda" typeface="Tunga"/>
+        <a:font script="Guru" typeface="Raavi"/>
+        <a:font script="Cans" typeface="Euphemia"/>
+        <a:font script="Cher" typeface="Plantagenet Cherokee"/>
+        <a:font script="Yiii" typeface="Microsoft Yi Baiti"/>
+        <a:font script="Tibt" typeface="Microsoft Himalaya"/>
+        <a:font script="Thaa" typeface="MV Boli"/>
+        <a:font script="Deva" typeface="Mangal"/>
+        <a:font script="Telu" typeface="Gautami"/>
+        <a:font script="Taml" typeface="Latha"/>
+        <a:font script="Syrc" typeface="Estrangelo Edessa"/>
+        <a:font script="Orya" typeface="Kalinga"/>
+        <a:font script="Mlym" typeface="Kartika"/>
+        <a:font script="Laoo" typeface="DokChampa"/>
+        <a:font script="Sinh" typeface="Iskoola Pota"/>
+        <a:font script="Mong" typeface="Mongolian Baiti"/>
+        <a:font script="Viet" typeface="Times New Roman"/>
+        <a:font script="Uigh" typeface="Microsoft Uighur"/>
+        <a:font script="Geor" typeface="Sylfaen"/>
+      </a:majorFont>
+      <a:minorFont>
+        <a:latin typeface="Calibri" panose="020F0502020204030204"/>
+        <a:ea typeface=""/>
+        <a:cs typeface=""/>
+        <a:font script="Jpan" typeface="Yu Gothic"/>
+        <a:font script="Hang" typeface="맑은 고딕"/>
+        <a:font script="Hans" typeface="DengXian"/>
+        <a:font script="Hant" typeface="新細明體"/>
+        <a:font script="Arab" typeface="Arial"/>
+        <a:font script="Hebr" typeface="Arial"/>
+        <a:font script="Thai" typeface="Cordia New"/>
+        <a:font script="Ethi" typeface="Nyala"/>
+        <a:font script="Beng" typeface="Vrinda"/>
+        <a:font script="Gujr" typeface="Shruti"/>
+        <a:font script="Khmr" typeface="DaunPenh"/>
+        <a:font script="Knda" typeface="Tunga"/>
+        <a:font script="Guru" typeface="Raavi"/>
+        <a:font script="Cans" typeface="Euphemia"/>
+        <a:font script="Cher" typeface="Plantagenet Cherokee"/>
+        <a:font script="Yiii" typeface="Microsoft Yi Baiti"/>
+        <a:font script="Tibt" typeface="Microsoft Himalaya"/>
+        <a:font script="Thaa" typeface="MV Boli"/>
+        <a:font script="Deva" typeface="Mangal"/>
+        <a:font script="Telu" typeface="Gautami"/>
+        <a:font script="Taml" typeface="Latha"/>
+        <a:font script="Syrc" typeface="Estrangelo Edessa"/>
+        <a:font script="Orya" typeface="Kalinga"/>
+        <a:font script="Mlym" typeface="Kartika"/>
+        <a:font script="Laoo" typeface="DokChampa"/>
+        <a:font script="Sinh" typeface="Iskoola Pota"/>
+        <a:font script="Mong" typeface="Mongolian Baiti"/>
+        <a:font script="Viet" typeface="Arial"/>
+        <a:font script="Uigh" typeface="Microsoft Uighur"/>
+        <a:font script="Geor" typeface="Sylfaen"/>
+      </a:minorFont>
+    </a:fontScheme>
+    <a:fmtScheme name="Office">
+      <a:fillStyleLst>
+        <a:solidFill>
+          <a:schemeClr val="phClr"/>
+        </a:solidFill>
+        <a:gradFill rotWithShape="1">
+          <a:gsLst>
+            <a:gs pos="0">
+              <a:schemeClr val="phClr">
+                <a:lumMod val="110000"/>
+                <a:satMod val="105000"/>
+                <a:tint val="67000"/>
+              </a:schemeClr>
+            </a:gs>
+            <a:gs pos="50000">
+              <a:schemeClr val="phClr">
+                <a:lumMod val="105000"/>
+                <a:satMod val="103000"/>
+                <a:tint val="73000"/>
+              </a:schemeClr>
+            </a:gs>
+            <a:gs pos="100000">
+              <a:schemeClr val="phClr">
+                <a:lumMod val="105000"/>
+                <a:satMod val="109000"/>
+                <a:tint val="81000"/>
+              </a:schemeClr>
+            </a:gs>
+          </a:gsLst>
+          <a:lin ang="5400000" scaled="0"/>
+        </a:gradFill>
+        <a:gradFill rotWithShape="1">
+          <a:gsLst>
+            <a:gs pos="0">
+              <a:schemeClr val="phClr">
+                <a:satMod val="103000"/>
+                <a:lumMod val="102000"/>
+                <a:tint val="94000"/>
+              </a:schemeClr>
+            </a:gs>
+            <a:gs pos="50000">
+              <a:schemeClr val="phClr">
+                <a:satMod val="110000"/>
+                <a:lumMod val="100000"/>
+                <a:shade val="100000"/>
+              </a:schemeClr>
+            </a:gs>
+            <a:gs pos="100000">
+              <a:schemeClr val="phClr">
+                <a:lumMod val="99000"/>
+                <a:satMod val="120000"/>
+                <a:shade val="78000"/>
+              </a:schemeClr>
+            </a:gs>
+          </a:gsLst>
+          <a:lin ang="5400000" scaled="0"/>
+        </a:gradFill>
+      </a:fillStyleLst>
+      <a:lnStyleLst>
+        <a:ln w="6350" cap="flat" cmpd="sng" algn="ctr">
+          <a:solidFill>
+            <a:schemeClr val="phClr"/>
+          </a:solidFill>
+          <a:prstDash val="solid"/>
+          <a:miter lim="800000"/>
+        </a:ln>
+        <a:ln w="12700" cap="flat" cmpd="sng" algn="ctr">
+          <a:solidFill>
+            <a:schemeClr val="phClr"/>
+          </a:solidFill>
+          <a:prstDash val="solid"/>
+          <a:miter lim="800000"/>
+        </a:ln>
+        <a:ln w="19050" cap="flat" cmpd="sng" algn="ctr">
+          <a:solidFill>
+            <a:schemeClr val="phClr"/>
+          </a:solidFill>
+          <a:prstDash val="solid"/>
+          <a:miter lim="800000"/>
+        </a:ln>
+      </a:lnStyleLst>
+      <a:effectStyleLst>
+        <a:effectStyle>
+          <a:effectLst/>
+        </a:effectStyle>
+        <a:effectStyle>
+          <a:effectLst/>
+        </a:effectStyle>
+        <a:effectStyle>
+          <a:effectLst>
+            <a:outerShdw blurRad="57150" dist="19050" dir="5400000" algn="ctr" rotWithShape="0">
+              <a:srgbClr val="000000">
+                <a:alpha val="63000"/>
+              </a:srgbClr>
+            </a:outerShdw>
+          </a:effectLst>
+        </a:effectStyle>
+      </a:effectStyleLst>
+      <a:bgFillStyleLst>
+        <a:solidFill>
+          <a:schemeClr val="phClr"/>
+        </a:solidFill>
+        <a:solidFill>
+          <a:schemeClr val="phClr">
+            <a:tint val="95000"/>
+            <a:satMod val="170000"/>
+          </a:schemeClr>
+        </a:solidFill>
+        <a:gradFill rotWithShape="1">
+          <a:gsLst>
+            <a:gs pos="0">
+              <a:schemeClr val="phClr">
+                <a:tint val="93000"/>
+                <a:satMod val="150000"/>
+                <a:shade val="98000"/>
+                <a:lumMod val="102000"/>
+              </a:schemeClr>
+            </a:gs>
+            <a:gs pos="50000">
+              <a:schemeClr val="phClr">
+                <a:tint val="98000"/>
+                <a:satMod val="130000"/>
+                <a:shade val="90000"/>
+                <a:lumMod val="103000"/>
+              </a:schemeClr>
+            </a:gs>
+            <a:gs pos="100000">
+              <a:schemeClr val="phClr">
+                <a:shade val="63000"/>
+                <a:satMod val="120000"/>
+              </a:schemeClr>
+            </a:gs>
+          </a:gsLst>
+          <a:lin ang="5400000" scaled="0"/>
+        </a:gradFill>
+      </a:bgFillStyleLst>
+    </a:fmtScheme>
+  </a:themeElements>
+  <a:objectDefaults/>
+  <a:extraClrSchemeLst/>
+  <a:extLst>
+    <a:ext uri="{05A4C25C-085E-4340-85A3-A5531E510DB2}">
+      <thm15:themeFamily xmlns:thm15="http://schemas.microsoft.com/office/thememl/2012/main" name="Office Theme" id="{62F939B6-93AF-4DB8-9C6B-D6C7DFDC589F}" vid="{4A3C46E8-61CC-4603-A589-7422A47A8E4A}"/>
+    </a:ext>
+  </a:extLst>
+</a:theme>
 </file>
</xml_diff>